<commit_message>
Updated with another Expression.
</commit_message>
<xml_diff>
--- a/Unit Three/src/com.bayviewglen.dayfive/deMorgans Laws and Logical Expressions.pptx
+++ b/Unit Three/src/com.bayviewglen.dayfive/deMorgans Laws and Logical Expressions.pptx
@@ -5,10 +5,10 @@
     <p:sldMasterId id="2147483796" r:id="rId1"/>
   </p:sldMasterIdLst>
   <p:notesMasterIdLst>
-    <p:notesMasterId r:id="rId28"/>
+    <p:notesMasterId r:id="rId27"/>
   </p:notesMasterIdLst>
   <p:handoutMasterIdLst>
-    <p:handoutMasterId r:id="rId29"/>
+    <p:handoutMasterId r:id="rId28"/>
   </p:handoutMasterIdLst>
   <p:sldIdLst>
     <p:sldId id="393" r:id="rId2"/>
@@ -33,10 +33,9 @@
     <p:sldId id="400" r:id="rId21"/>
     <p:sldId id="397" r:id="rId22"/>
     <p:sldId id="403" r:id="rId23"/>
-    <p:sldId id="404" r:id="rId24"/>
-    <p:sldId id="401" r:id="rId25"/>
-    <p:sldId id="402" r:id="rId26"/>
-    <p:sldId id="405" r:id="rId27"/>
+    <p:sldId id="401" r:id="rId24"/>
+    <p:sldId id="402" r:id="rId25"/>
+    <p:sldId id="405" r:id="rId26"/>
   </p:sldIdLst>
   <p:sldSz cx="9144000" cy="6858000" type="screen4x3"/>
   <p:notesSz cx="7315200" cy="9601200"/>
@@ -4342,41 +4341,9 @@
       </p:grpSpPr>
       <p:sp>
         <p:nvSpPr>
-          <p:cNvPr id="32770" name="Rectangle 7"/>
+          <p:cNvPr id="37890" name="Slide Image Placeholder 1"/>
           <p:cNvSpPr>
-            <a:spLocks noGrp="1" noChangeArrowheads="1"/>
-          </p:cNvSpPr>
-          <p:nvPr>
-            <p:ph type="sldNum" sz="quarter" idx="5"/>
-          </p:nvPr>
-        </p:nvSpPr>
-        <p:spPr>
-          <a:noFill/>
-        </p:spPr>
-        <p:txBody>
-          <a:bodyPr/>
-          <a:lstStyle/>
-          <a:p>
-            <a:fld id="{7180793E-AD40-4164-91D8-57353229A9E9}" type="slidenum">
-              <a:rPr lang="en-US" smtClean="0">
-                <a:latin typeface="Arial" pitchFamily="34" charset="0"/>
-                <a:cs typeface="Arial" pitchFamily="34" charset="0"/>
-              </a:rPr>
-              <a:pPr/>
-              <a:t>23</a:t>
-            </a:fld>
-            <a:endParaRPr lang="en-US" smtClean="0">
-              <a:latin typeface="Arial" pitchFamily="34" charset="0"/>
-              <a:cs typeface="Arial" pitchFamily="34" charset="0"/>
-            </a:endParaRPr>
-          </a:p>
-        </p:txBody>
-      </p:sp>
-      <p:sp>
-        <p:nvSpPr>
-          <p:cNvPr id="32771" name="Rectangle 2"/>
-          <p:cNvSpPr>
-            <a:spLocks noGrp="1" noRot="1" noChangeAspect="1" noChangeArrowheads="1" noTextEdit="1"/>
+            <a:spLocks noGrp="1" noRot="1" noChangeAspect="1" noTextEdit="1"/>
           </p:cNvSpPr>
           <p:nvPr>
             <p:ph type="sldImg"/>
@@ -4388,9 +4355,9 @@
       </p:sp>
       <p:sp>
         <p:nvSpPr>
-          <p:cNvPr id="32772" name="Rectangle 3"/>
+          <p:cNvPr id="37891" name="Notes Placeholder 2"/>
           <p:cNvSpPr>
-            <a:spLocks noGrp="1" noChangeArrowheads="1"/>
+            <a:spLocks noGrp="1"/>
           </p:cNvSpPr>
           <p:nvPr>
             <p:ph type="body" idx="1"/>
@@ -4399,23 +4366,651 @@
         <p:spPr>
           <a:noFill/>
           <a:ln/>
+          <a:extLst>
+            <a:ext uri="{909E8E84-426E-40DD-AFC4-6F175D3DCCD1}">
+              <a14:hiddenFill xmlns:a14="http://schemas.microsoft.com/office/drawing/2010/main">
+                <a:solidFill>
+                  <a:srgbClr val="FFFFFF"/>
+                </a:solidFill>
+              </a14:hiddenFill>
+            </a:ext>
+            <a:ext uri="{91240B29-F687-4F45-9708-019B960494DF}">
+              <a14:hiddenLine xmlns:a14="http://schemas.microsoft.com/office/drawing/2010/main" w="9525">
+                <a:solidFill>
+                  <a:srgbClr val="000000"/>
+                </a:solidFill>
+                <a:miter lim="800000"/>
+                <a:headEnd/>
+                <a:tailEnd/>
+              </a14:hiddenLine>
+            </a:ext>
+          </a:extLst>
         </p:spPr>
         <p:txBody>
           <a:bodyPr/>
           <a:lstStyle/>
           <a:p>
+            <a:r>
+              <a:rPr lang="en-US" smtClean="0">
+                <a:latin typeface="Arial" panose="020B0604020202020204" pitchFamily="34" charset="0"/>
+              </a:rPr>
+              <a:t>Updates of the Boolean Theorems with the addition of DeMorgan’s</a:t>
+            </a:r>
+          </a:p>
+        </p:txBody>
+      </p:sp>
+      <p:sp>
+        <p:nvSpPr>
+          <p:cNvPr id="37892" name="Header Placeholder 3"/>
+          <p:cNvSpPr>
+            <a:spLocks noGrp="1"/>
+          </p:cNvSpPr>
+          <p:nvPr>
+            <p:ph type="hdr" sz="quarter"/>
+          </p:nvPr>
+        </p:nvSpPr>
+        <p:spPr>
+          <a:noFill/>
+          <a:ln/>
+          <a:extLst>
+            <a:ext uri="{909E8E84-426E-40DD-AFC4-6F175D3DCCD1}">
+              <a14:hiddenFill xmlns:a14="http://schemas.microsoft.com/office/drawing/2010/main">
+                <a:solidFill>
+                  <a:srgbClr val="FFFFFF"/>
+                </a:solidFill>
+              </a14:hiddenFill>
+            </a:ext>
+            <a:ext uri="{91240B29-F687-4F45-9708-019B960494DF}">
+              <a14:hiddenLine xmlns:a14="http://schemas.microsoft.com/office/drawing/2010/main" w="9525">
+                <a:solidFill>
+                  <a:srgbClr val="000000"/>
+                </a:solidFill>
+                <a:miter lim="800000"/>
+                <a:headEnd/>
+                <a:tailEnd/>
+              </a14:hiddenLine>
+            </a:ext>
+          </a:extLst>
+        </p:spPr>
+        <p:txBody>
+          <a:bodyPr/>
+          <a:lstStyle>
+            <a:lvl1pPr eaLnBrk="0" hangingPunct="0">
+              <a:defRPr>
+                <a:solidFill>
+                  <a:schemeClr val="tx1"/>
+                </a:solidFill>
+                <a:latin typeface="Arial" panose="020B0604020202020204" pitchFamily="34" charset="0"/>
+                <a:cs typeface="Arial" panose="020B0604020202020204" pitchFamily="34" charset="0"/>
+              </a:defRPr>
+            </a:lvl1pPr>
+            <a:lvl2pPr marL="742950" indent="-285750" eaLnBrk="0" hangingPunct="0">
+              <a:defRPr>
+                <a:solidFill>
+                  <a:schemeClr val="tx1"/>
+                </a:solidFill>
+                <a:latin typeface="Arial" panose="020B0604020202020204" pitchFamily="34" charset="0"/>
+                <a:cs typeface="Arial" panose="020B0604020202020204" pitchFamily="34" charset="0"/>
+              </a:defRPr>
+            </a:lvl2pPr>
+            <a:lvl3pPr marL="1143000" indent="-228600" eaLnBrk="0" hangingPunct="0">
+              <a:defRPr>
+                <a:solidFill>
+                  <a:schemeClr val="tx1"/>
+                </a:solidFill>
+                <a:latin typeface="Arial" panose="020B0604020202020204" pitchFamily="34" charset="0"/>
+                <a:cs typeface="Arial" panose="020B0604020202020204" pitchFamily="34" charset="0"/>
+              </a:defRPr>
+            </a:lvl3pPr>
+            <a:lvl4pPr marL="1600200" indent="-228600" eaLnBrk="0" hangingPunct="0">
+              <a:defRPr>
+                <a:solidFill>
+                  <a:schemeClr val="tx1"/>
+                </a:solidFill>
+                <a:latin typeface="Arial" panose="020B0604020202020204" pitchFamily="34" charset="0"/>
+                <a:cs typeface="Arial" panose="020B0604020202020204" pitchFamily="34" charset="0"/>
+              </a:defRPr>
+            </a:lvl4pPr>
+            <a:lvl5pPr marL="2057400" indent="-228600" eaLnBrk="0" hangingPunct="0">
+              <a:defRPr>
+                <a:solidFill>
+                  <a:schemeClr val="tx1"/>
+                </a:solidFill>
+                <a:latin typeface="Arial" panose="020B0604020202020204" pitchFamily="34" charset="0"/>
+                <a:cs typeface="Arial" panose="020B0604020202020204" pitchFamily="34" charset="0"/>
+              </a:defRPr>
+            </a:lvl5pPr>
+            <a:lvl6pPr marL="2514600" indent="-228600" eaLnBrk="0" fontAlgn="base" hangingPunct="0">
+              <a:spcBef>
+                <a:spcPct val="0"/>
+              </a:spcBef>
+              <a:spcAft>
+                <a:spcPct val="0"/>
+              </a:spcAft>
+              <a:defRPr>
+                <a:solidFill>
+                  <a:schemeClr val="tx1"/>
+                </a:solidFill>
+                <a:latin typeface="Arial" panose="020B0604020202020204" pitchFamily="34" charset="0"/>
+                <a:cs typeface="Arial" panose="020B0604020202020204" pitchFamily="34" charset="0"/>
+              </a:defRPr>
+            </a:lvl6pPr>
+            <a:lvl7pPr marL="2971800" indent="-228600" eaLnBrk="0" fontAlgn="base" hangingPunct="0">
+              <a:spcBef>
+                <a:spcPct val="0"/>
+              </a:spcBef>
+              <a:spcAft>
+                <a:spcPct val="0"/>
+              </a:spcAft>
+              <a:defRPr>
+                <a:solidFill>
+                  <a:schemeClr val="tx1"/>
+                </a:solidFill>
+                <a:latin typeface="Arial" panose="020B0604020202020204" pitchFamily="34" charset="0"/>
+                <a:cs typeface="Arial" panose="020B0604020202020204" pitchFamily="34" charset="0"/>
+              </a:defRPr>
+            </a:lvl7pPr>
+            <a:lvl8pPr marL="3429000" indent="-228600" eaLnBrk="0" fontAlgn="base" hangingPunct="0">
+              <a:spcBef>
+                <a:spcPct val="0"/>
+              </a:spcBef>
+              <a:spcAft>
+                <a:spcPct val="0"/>
+              </a:spcAft>
+              <a:defRPr>
+                <a:solidFill>
+                  <a:schemeClr val="tx1"/>
+                </a:solidFill>
+                <a:latin typeface="Arial" panose="020B0604020202020204" pitchFamily="34" charset="0"/>
+                <a:cs typeface="Arial" panose="020B0604020202020204" pitchFamily="34" charset="0"/>
+              </a:defRPr>
+            </a:lvl8pPr>
+            <a:lvl9pPr marL="3886200" indent="-228600" eaLnBrk="0" fontAlgn="base" hangingPunct="0">
+              <a:spcBef>
+                <a:spcPct val="0"/>
+              </a:spcBef>
+              <a:spcAft>
+                <a:spcPct val="0"/>
+              </a:spcAft>
+              <a:defRPr>
+                <a:solidFill>
+                  <a:schemeClr val="tx1"/>
+                </a:solidFill>
+                <a:latin typeface="Arial" panose="020B0604020202020204" pitchFamily="34" charset="0"/>
+                <a:cs typeface="Arial" panose="020B0604020202020204" pitchFamily="34" charset="0"/>
+              </a:defRPr>
+            </a:lvl9pPr>
+          </a:lstStyle>
+          <a:p>
             <a:pPr eaLnBrk="1" hangingPunct="1"/>
-            <a:endParaRPr lang="en-US" dirty="0" smtClean="0">
-              <a:latin typeface="Arial" pitchFamily="34" charset="0"/>
-              <a:cs typeface="Arial" pitchFamily="34" charset="0"/>
-            </a:endParaRPr>
+            <a:r>
+              <a:rPr lang="en-US" smtClean="0"/>
+              <a:t>DeMorgan’s Theorems</a:t>
+            </a:r>
+          </a:p>
+        </p:txBody>
+      </p:sp>
+      <p:sp>
+        <p:nvSpPr>
+          <p:cNvPr id="37893" name="Date Placeholder 4"/>
+          <p:cNvSpPr>
+            <a:spLocks noGrp="1"/>
+          </p:cNvSpPr>
+          <p:nvPr>
+            <p:ph type="dt" sz="quarter" idx="1"/>
+          </p:nvPr>
+        </p:nvSpPr>
+        <p:spPr>
+          <a:noFill/>
+          <a:ln/>
+          <a:extLst>
+            <a:ext uri="{909E8E84-426E-40DD-AFC4-6F175D3DCCD1}">
+              <a14:hiddenFill xmlns:a14="http://schemas.microsoft.com/office/drawing/2010/main">
+                <a:solidFill>
+                  <a:srgbClr val="FFFFFF"/>
+                </a:solidFill>
+              </a14:hiddenFill>
+            </a:ext>
+            <a:ext uri="{91240B29-F687-4F45-9708-019B960494DF}">
+              <a14:hiddenLine xmlns:a14="http://schemas.microsoft.com/office/drawing/2010/main" w="9525">
+                <a:solidFill>
+                  <a:srgbClr val="000000"/>
+                </a:solidFill>
+                <a:miter lim="800000"/>
+                <a:headEnd/>
+                <a:tailEnd/>
+              </a14:hiddenLine>
+            </a:ext>
+          </a:extLst>
+        </p:spPr>
+        <p:txBody>
+          <a:bodyPr/>
+          <a:lstStyle>
+            <a:lvl1pPr eaLnBrk="0" hangingPunct="0">
+              <a:defRPr>
+                <a:solidFill>
+                  <a:schemeClr val="tx1"/>
+                </a:solidFill>
+                <a:latin typeface="Arial" panose="020B0604020202020204" pitchFamily="34" charset="0"/>
+                <a:cs typeface="Arial" panose="020B0604020202020204" pitchFamily="34" charset="0"/>
+              </a:defRPr>
+            </a:lvl1pPr>
+            <a:lvl2pPr marL="742950" indent="-285750" eaLnBrk="0" hangingPunct="0">
+              <a:defRPr>
+                <a:solidFill>
+                  <a:schemeClr val="tx1"/>
+                </a:solidFill>
+                <a:latin typeface="Arial" panose="020B0604020202020204" pitchFamily="34" charset="0"/>
+                <a:cs typeface="Arial" panose="020B0604020202020204" pitchFamily="34" charset="0"/>
+              </a:defRPr>
+            </a:lvl2pPr>
+            <a:lvl3pPr marL="1143000" indent="-228600" eaLnBrk="0" hangingPunct="0">
+              <a:defRPr>
+                <a:solidFill>
+                  <a:schemeClr val="tx1"/>
+                </a:solidFill>
+                <a:latin typeface="Arial" panose="020B0604020202020204" pitchFamily="34" charset="0"/>
+                <a:cs typeface="Arial" panose="020B0604020202020204" pitchFamily="34" charset="0"/>
+              </a:defRPr>
+            </a:lvl3pPr>
+            <a:lvl4pPr marL="1600200" indent="-228600" eaLnBrk="0" hangingPunct="0">
+              <a:defRPr>
+                <a:solidFill>
+                  <a:schemeClr val="tx1"/>
+                </a:solidFill>
+                <a:latin typeface="Arial" panose="020B0604020202020204" pitchFamily="34" charset="0"/>
+                <a:cs typeface="Arial" panose="020B0604020202020204" pitchFamily="34" charset="0"/>
+              </a:defRPr>
+            </a:lvl4pPr>
+            <a:lvl5pPr marL="2057400" indent="-228600" eaLnBrk="0" hangingPunct="0">
+              <a:defRPr>
+                <a:solidFill>
+                  <a:schemeClr val="tx1"/>
+                </a:solidFill>
+                <a:latin typeface="Arial" panose="020B0604020202020204" pitchFamily="34" charset="0"/>
+                <a:cs typeface="Arial" panose="020B0604020202020204" pitchFamily="34" charset="0"/>
+              </a:defRPr>
+            </a:lvl5pPr>
+            <a:lvl6pPr marL="2514600" indent="-228600" eaLnBrk="0" fontAlgn="base" hangingPunct="0">
+              <a:spcBef>
+                <a:spcPct val="0"/>
+              </a:spcBef>
+              <a:spcAft>
+                <a:spcPct val="0"/>
+              </a:spcAft>
+              <a:defRPr>
+                <a:solidFill>
+                  <a:schemeClr val="tx1"/>
+                </a:solidFill>
+                <a:latin typeface="Arial" panose="020B0604020202020204" pitchFamily="34" charset="0"/>
+                <a:cs typeface="Arial" panose="020B0604020202020204" pitchFamily="34" charset="0"/>
+              </a:defRPr>
+            </a:lvl6pPr>
+            <a:lvl7pPr marL="2971800" indent="-228600" eaLnBrk="0" fontAlgn="base" hangingPunct="0">
+              <a:spcBef>
+                <a:spcPct val="0"/>
+              </a:spcBef>
+              <a:spcAft>
+                <a:spcPct val="0"/>
+              </a:spcAft>
+              <a:defRPr>
+                <a:solidFill>
+                  <a:schemeClr val="tx1"/>
+                </a:solidFill>
+                <a:latin typeface="Arial" panose="020B0604020202020204" pitchFamily="34" charset="0"/>
+                <a:cs typeface="Arial" panose="020B0604020202020204" pitchFamily="34" charset="0"/>
+              </a:defRPr>
+            </a:lvl7pPr>
+            <a:lvl8pPr marL="3429000" indent="-228600" eaLnBrk="0" fontAlgn="base" hangingPunct="0">
+              <a:spcBef>
+                <a:spcPct val="0"/>
+              </a:spcBef>
+              <a:spcAft>
+                <a:spcPct val="0"/>
+              </a:spcAft>
+              <a:defRPr>
+                <a:solidFill>
+                  <a:schemeClr val="tx1"/>
+                </a:solidFill>
+                <a:latin typeface="Arial" panose="020B0604020202020204" pitchFamily="34" charset="0"/>
+                <a:cs typeface="Arial" panose="020B0604020202020204" pitchFamily="34" charset="0"/>
+              </a:defRPr>
+            </a:lvl8pPr>
+            <a:lvl9pPr marL="3886200" indent="-228600" eaLnBrk="0" fontAlgn="base" hangingPunct="0">
+              <a:spcBef>
+                <a:spcPct val="0"/>
+              </a:spcBef>
+              <a:spcAft>
+                <a:spcPct val="0"/>
+              </a:spcAft>
+              <a:defRPr>
+                <a:solidFill>
+                  <a:schemeClr val="tx1"/>
+                </a:solidFill>
+                <a:latin typeface="Arial" panose="020B0604020202020204" pitchFamily="34" charset="0"/>
+                <a:cs typeface="Arial" panose="020B0604020202020204" pitchFamily="34" charset="0"/>
+              </a:defRPr>
+            </a:lvl9pPr>
+          </a:lstStyle>
+          <a:p>
+            <a:pPr eaLnBrk="1" hangingPunct="1"/>
+            <a:r>
+              <a:rPr lang="en-US" smtClean="0"/>
+              <a:t>Digital Electronics </a:t>
+            </a:r>
+            <a:r>
+              <a:rPr lang="en-US" smtClean="0">
+                <a:sym typeface="Symbol" panose="05050102010706020507" pitchFamily="18" charset="2"/>
+              </a:rPr>
+              <a:t></a:t>
+            </a:r>
+          </a:p>
+          <a:p>
+            <a:pPr eaLnBrk="1" hangingPunct="1"/>
+            <a:r>
+              <a:rPr lang="en-US" smtClean="0">
+                <a:sym typeface="Symbol" panose="05050102010706020507" pitchFamily="18" charset="2"/>
+              </a:rPr>
+              <a:t>2,1 Introduction to AOI Logic</a:t>
+            </a:r>
+            <a:endParaRPr lang="en-US" smtClean="0"/>
+          </a:p>
+        </p:txBody>
+      </p:sp>
+      <p:sp>
+        <p:nvSpPr>
+          <p:cNvPr id="37894" name="Footer Placeholder 5"/>
+          <p:cNvSpPr>
+            <a:spLocks noGrp="1"/>
+          </p:cNvSpPr>
+          <p:nvPr>
+            <p:ph type="ftr" sz="quarter" idx="4"/>
+          </p:nvPr>
+        </p:nvSpPr>
+        <p:spPr>
+          <a:noFill/>
+          <a:ln/>
+          <a:extLst>
+            <a:ext uri="{909E8E84-426E-40DD-AFC4-6F175D3DCCD1}">
+              <a14:hiddenFill xmlns:a14="http://schemas.microsoft.com/office/drawing/2010/main">
+                <a:solidFill>
+                  <a:srgbClr val="FFFFFF"/>
+                </a:solidFill>
+              </a14:hiddenFill>
+            </a:ext>
+            <a:ext uri="{91240B29-F687-4F45-9708-019B960494DF}">
+              <a14:hiddenLine xmlns:a14="http://schemas.microsoft.com/office/drawing/2010/main" w="9525">
+                <a:solidFill>
+                  <a:srgbClr val="000000"/>
+                </a:solidFill>
+                <a:miter lim="800000"/>
+                <a:headEnd/>
+                <a:tailEnd/>
+              </a14:hiddenLine>
+            </a:ext>
+          </a:extLst>
+        </p:spPr>
+        <p:txBody>
+          <a:bodyPr/>
+          <a:lstStyle>
+            <a:lvl1pPr eaLnBrk="0" hangingPunct="0">
+              <a:defRPr>
+                <a:solidFill>
+                  <a:schemeClr val="tx1"/>
+                </a:solidFill>
+                <a:latin typeface="Arial" panose="020B0604020202020204" pitchFamily="34" charset="0"/>
+                <a:cs typeface="Arial" panose="020B0604020202020204" pitchFamily="34" charset="0"/>
+              </a:defRPr>
+            </a:lvl1pPr>
+            <a:lvl2pPr marL="742950" indent="-285750" eaLnBrk="0" hangingPunct="0">
+              <a:defRPr>
+                <a:solidFill>
+                  <a:schemeClr val="tx1"/>
+                </a:solidFill>
+                <a:latin typeface="Arial" panose="020B0604020202020204" pitchFamily="34" charset="0"/>
+                <a:cs typeface="Arial" panose="020B0604020202020204" pitchFamily="34" charset="0"/>
+              </a:defRPr>
+            </a:lvl2pPr>
+            <a:lvl3pPr marL="1143000" indent="-228600" eaLnBrk="0" hangingPunct="0">
+              <a:defRPr>
+                <a:solidFill>
+                  <a:schemeClr val="tx1"/>
+                </a:solidFill>
+                <a:latin typeface="Arial" panose="020B0604020202020204" pitchFamily="34" charset="0"/>
+                <a:cs typeface="Arial" panose="020B0604020202020204" pitchFamily="34" charset="0"/>
+              </a:defRPr>
+            </a:lvl3pPr>
+            <a:lvl4pPr marL="1600200" indent="-228600" eaLnBrk="0" hangingPunct="0">
+              <a:defRPr>
+                <a:solidFill>
+                  <a:schemeClr val="tx1"/>
+                </a:solidFill>
+                <a:latin typeface="Arial" panose="020B0604020202020204" pitchFamily="34" charset="0"/>
+                <a:cs typeface="Arial" panose="020B0604020202020204" pitchFamily="34" charset="0"/>
+              </a:defRPr>
+            </a:lvl4pPr>
+            <a:lvl5pPr marL="2057400" indent="-228600" eaLnBrk="0" hangingPunct="0">
+              <a:defRPr>
+                <a:solidFill>
+                  <a:schemeClr val="tx1"/>
+                </a:solidFill>
+                <a:latin typeface="Arial" panose="020B0604020202020204" pitchFamily="34" charset="0"/>
+                <a:cs typeface="Arial" panose="020B0604020202020204" pitchFamily="34" charset="0"/>
+              </a:defRPr>
+            </a:lvl5pPr>
+            <a:lvl6pPr marL="2514600" indent="-228600" eaLnBrk="0" fontAlgn="base" hangingPunct="0">
+              <a:spcBef>
+                <a:spcPct val="0"/>
+              </a:spcBef>
+              <a:spcAft>
+                <a:spcPct val="0"/>
+              </a:spcAft>
+              <a:defRPr>
+                <a:solidFill>
+                  <a:schemeClr val="tx1"/>
+                </a:solidFill>
+                <a:latin typeface="Arial" panose="020B0604020202020204" pitchFamily="34" charset="0"/>
+                <a:cs typeface="Arial" panose="020B0604020202020204" pitchFamily="34" charset="0"/>
+              </a:defRPr>
+            </a:lvl6pPr>
+            <a:lvl7pPr marL="2971800" indent="-228600" eaLnBrk="0" fontAlgn="base" hangingPunct="0">
+              <a:spcBef>
+                <a:spcPct val="0"/>
+              </a:spcBef>
+              <a:spcAft>
+                <a:spcPct val="0"/>
+              </a:spcAft>
+              <a:defRPr>
+                <a:solidFill>
+                  <a:schemeClr val="tx1"/>
+                </a:solidFill>
+                <a:latin typeface="Arial" panose="020B0604020202020204" pitchFamily="34" charset="0"/>
+                <a:cs typeface="Arial" panose="020B0604020202020204" pitchFamily="34" charset="0"/>
+              </a:defRPr>
+            </a:lvl7pPr>
+            <a:lvl8pPr marL="3429000" indent="-228600" eaLnBrk="0" fontAlgn="base" hangingPunct="0">
+              <a:spcBef>
+                <a:spcPct val="0"/>
+              </a:spcBef>
+              <a:spcAft>
+                <a:spcPct val="0"/>
+              </a:spcAft>
+              <a:defRPr>
+                <a:solidFill>
+                  <a:schemeClr val="tx1"/>
+                </a:solidFill>
+                <a:latin typeface="Arial" panose="020B0604020202020204" pitchFamily="34" charset="0"/>
+                <a:cs typeface="Arial" panose="020B0604020202020204" pitchFamily="34" charset="0"/>
+              </a:defRPr>
+            </a:lvl8pPr>
+            <a:lvl9pPr marL="3886200" indent="-228600" eaLnBrk="0" fontAlgn="base" hangingPunct="0">
+              <a:spcBef>
+                <a:spcPct val="0"/>
+              </a:spcBef>
+              <a:spcAft>
+                <a:spcPct val="0"/>
+              </a:spcAft>
+              <a:defRPr>
+                <a:solidFill>
+                  <a:schemeClr val="tx1"/>
+                </a:solidFill>
+                <a:latin typeface="Arial" panose="020B0604020202020204" pitchFamily="34" charset="0"/>
+                <a:cs typeface="Arial" panose="020B0604020202020204" pitchFamily="34" charset="0"/>
+              </a:defRPr>
+            </a:lvl9pPr>
+          </a:lstStyle>
+          <a:p>
+            <a:pPr eaLnBrk="1" hangingPunct="1"/>
+            <a:r>
+              <a:rPr lang="en-US" smtClean="0"/>
+              <a:t>Project Lead The Way, Inc.</a:t>
+            </a:r>
+            <a:endParaRPr lang="en-US" baseline="30000" smtClean="0"/>
+          </a:p>
+          <a:p>
+            <a:pPr eaLnBrk="1" hangingPunct="1"/>
+            <a:r>
+              <a:rPr lang="en-US" smtClean="0"/>
+              <a:t>Copyright 2009</a:t>
+            </a:r>
+          </a:p>
+        </p:txBody>
+      </p:sp>
+      <p:sp>
+        <p:nvSpPr>
+          <p:cNvPr id="7" name="Slide Number Placeholder 6"/>
+          <p:cNvSpPr>
+            <a:spLocks noGrp="1"/>
+          </p:cNvSpPr>
+          <p:nvPr>
+            <p:ph type="sldNum" sz="quarter" idx="5"/>
+          </p:nvPr>
+        </p:nvSpPr>
+        <p:spPr/>
+        <p:txBody>
+          <a:bodyPr/>
+          <a:lstStyle>
+            <a:lvl1pPr eaLnBrk="0" hangingPunct="0">
+              <a:defRPr>
+                <a:solidFill>
+                  <a:schemeClr val="tx1"/>
+                </a:solidFill>
+                <a:latin typeface="Arial" panose="020B0604020202020204" pitchFamily="34" charset="0"/>
+                <a:cs typeface="Arial" panose="020B0604020202020204" pitchFamily="34" charset="0"/>
+              </a:defRPr>
+            </a:lvl1pPr>
+            <a:lvl2pPr marL="742950" indent="-285750" eaLnBrk="0" hangingPunct="0">
+              <a:defRPr>
+                <a:solidFill>
+                  <a:schemeClr val="tx1"/>
+                </a:solidFill>
+                <a:latin typeface="Arial" panose="020B0604020202020204" pitchFamily="34" charset="0"/>
+                <a:cs typeface="Arial" panose="020B0604020202020204" pitchFamily="34" charset="0"/>
+              </a:defRPr>
+            </a:lvl2pPr>
+            <a:lvl3pPr marL="1143000" indent="-228600" eaLnBrk="0" hangingPunct="0">
+              <a:defRPr>
+                <a:solidFill>
+                  <a:schemeClr val="tx1"/>
+                </a:solidFill>
+                <a:latin typeface="Arial" panose="020B0604020202020204" pitchFamily="34" charset="0"/>
+                <a:cs typeface="Arial" panose="020B0604020202020204" pitchFamily="34" charset="0"/>
+              </a:defRPr>
+            </a:lvl3pPr>
+            <a:lvl4pPr marL="1600200" indent="-228600" eaLnBrk="0" hangingPunct="0">
+              <a:defRPr>
+                <a:solidFill>
+                  <a:schemeClr val="tx1"/>
+                </a:solidFill>
+                <a:latin typeface="Arial" panose="020B0604020202020204" pitchFamily="34" charset="0"/>
+                <a:cs typeface="Arial" panose="020B0604020202020204" pitchFamily="34" charset="0"/>
+              </a:defRPr>
+            </a:lvl4pPr>
+            <a:lvl5pPr marL="2057400" indent="-228600" eaLnBrk="0" hangingPunct="0">
+              <a:defRPr>
+                <a:solidFill>
+                  <a:schemeClr val="tx1"/>
+                </a:solidFill>
+                <a:latin typeface="Arial" panose="020B0604020202020204" pitchFamily="34" charset="0"/>
+                <a:cs typeface="Arial" panose="020B0604020202020204" pitchFamily="34" charset="0"/>
+              </a:defRPr>
+            </a:lvl5pPr>
+            <a:lvl6pPr marL="2514600" indent="-228600" eaLnBrk="0" fontAlgn="base" hangingPunct="0">
+              <a:spcBef>
+                <a:spcPct val="0"/>
+              </a:spcBef>
+              <a:spcAft>
+                <a:spcPct val="0"/>
+              </a:spcAft>
+              <a:defRPr>
+                <a:solidFill>
+                  <a:schemeClr val="tx1"/>
+                </a:solidFill>
+                <a:latin typeface="Arial" panose="020B0604020202020204" pitchFamily="34" charset="0"/>
+                <a:cs typeface="Arial" panose="020B0604020202020204" pitchFamily="34" charset="0"/>
+              </a:defRPr>
+            </a:lvl6pPr>
+            <a:lvl7pPr marL="2971800" indent="-228600" eaLnBrk="0" fontAlgn="base" hangingPunct="0">
+              <a:spcBef>
+                <a:spcPct val="0"/>
+              </a:spcBef>
+              <a:spcAft>
+                <a:spcPct val="0"/>
+              </a:spcAft>
+              <a:defRPr>
+                <a:solidFill>
+                  <a:schemeClr val="tx1"/>
+                </a:solidFill>
+                <a:latin typeface="Arial" panose="020B0604020202020204" pitchFamily="34" charset="0"/>
+                <a:cs typeface="Arial" panose="020B0604020202020204" pitchFamily="34" charset="0"/>
+              </a:defRPr>
+            </a:lvl7pPr>
+            <a:lvl8pPr marL="3429000" indent="-228600" eaLnBrk="0" fontAlgn="base" hangingPunct="0">
+              <a:spcBef>
+                <a:spcPct val="0"/>
+              </a:spcBef>
+              <a:spcAft>
+                <a:spcPct val="0"/>
+              </a:spcAft>
+              <a:defRPr>
+                <a:solidFill>
+                  <a:schemeClr val="tx1"/>
+                </a:solidFill>
+                <a:latin typeface="Arial" panose="020B0604020202020204" pitchFamily="34" charset="0"/>
+                <a:cs typeface="Arial" panose="020B0604020202020204" pitchFamily="34" charset="0"/>
+              </a:defRPr>
+            </a:lvl8pPr>
+            <a:lvl9pPr marL="3886200" indent="-228600" eaLnBrk="0" fontAlgn="base" hangingPunct="0">
+              <a:spcBef>
+                <a:spcPct val="0"/>
+              </a:spcBef>
+              <a:spcAft>
+                <a:spcPct val="0"/>
+              </a:spcAft>
+              <a:defRPr>
+                <a:solidFill>
+                  <a:schemeClr val="tx1"/>
+                </a:solidFill>
+                <a:latin typeface="Arial" panose="020B0604020202020204" pitchFamily="34" charset="0"/>
+                <a:cs typeface="Arial" panose="020B0604020202020204" pitchFamily="34" charset="0"/>
+              </a:defRPr>
+            </a:lvl9pPr>
+          </a:lstStyle>
+          <a:p>
+            <a:pPr eaLnBrk="1" hangingPunct="1"/>
+            <a:fld id="{8CC6BA39-AC56-4E65-A4E8-CFDB16F84254}" type="slidenum">
+              <a:rPr lang="en-US"/>
+              <a:pPr eaLnBrk="1" hangingPunct="1"/>
+              <a:t>25</a:t>
+            </a:fld>
+            <a:endParaRPr lang="en-US"/>
           </a:p>
         </p:txBody>
       </p:sp>
     </p:spTree>
     <p:extLst>
       <p:ext uri="{BB962C8B-B14F-4D97-AF65-F5344CB8AC3E}">
-        <p14:creationId xmlns:p14="http://schemas.microsoft.com/office/powerpoint/2010/main" val="1556941056"/>
+        <p14:creationId xmlns:p14="http://schemas.microsoft.com/office/powerpoint/2010/main" val="2853510881"/>
       </p:ext>
     </p:extLst>
   </p:cSld>
@@ -4521,704 +5116,6 @@
     <p:extLst>
       <p:ext uri="{BB962C8B-B14F-4D97-AF65-F5344CB8AC3E}">
         <p14:creationId xmlns:p14="http://schemas.microsoft.com/office/powerpoint/2010/main" val="238097218"/>
-      </p:ext>
-    </p:extLst>
-  </p:cSld>
-  <p:clrMapOvr>
-    <a:masterClrMapping/>
-  </p:clrMapOvr>
-</p:notes>
-</file>
-
-<file path=ppt/notesSlides/notesSlide20.xml><?xml version="1.0" encoding="utf-8"?>
-<p:notes xmlns:a="http://schemas.openxmlformats.org/drawingml/2006/main" xmlns:r="http://schemas.openxmlformats.org/officeDocument/2006/relationships" xmlns:p="http://schemas.openxmlformats.org/presentationml/2006/main">
-  <p:cSld>
-    <p:spTree>
-      <p:nvGrpSpPr>
-        <p:cNvPr id="1" name=""/>
-        <p:cNvGrpSpPr/>
-        <p:nvPr/>
-      </p:nvGrpSpPr>
-      <p:grpSpPr>
-        <a:xfrm>
-          <a:off x="0" y="0"/>
-          <a:ext cx="0" cy="0"/>
-          <a:chOff x="0" y="0"/>
-          <a:chExt cx="0" cy="0"/>
-        </a:xfrm>
-      </p:grpSpPr>
-      <p:sp>
-        <p:nvSpPr>
-          <p:cNvPr id="37890" name="Slide Image Placeholder 1"/>
-          <p:cNvSpPr>
-            <a:spLocks noGrp="1" noRot="1" noChangeAspect="1" noTextEdit="1"/>
-          </p:cNvSpPr>
-          <p:nvPr>
-            <p:ph type="sldImg"/>
-          </p:nvPr>
-        </p:nvSpPr>
-        <p:spPr>
-          <a:ln/>
-        </p:spPr>
-      </p:sp>
-      <p:sp>
-        <p:nvSpPr>
-          <p:cNvPr id="37891" name="Notes Placeholder 2"/>
-          <p:cNvSpPr>
-            <a:spLocks noGrp="1"/>
-          </p:cNvSpPr>
-          <p:nvPr>
-            <p:ph type="body" idx="1"/>
-          </p:nvPr>
-        </p:nvSpPr>
-        <p:spPr>
-          <a:noFill/>
-          <a:ln/>
-          <a:extLst>
-            <a:ext uri="{909E8E84-426E-40DD-AFC4-6F175D3DCCD1}">
-              <a14:hiddenFill xmlns:a14="http://schemas.microsoft.com/office/drawing/2010/main">
-                <a:solidFill>
-                  <a:srgbClr val="FFFFFF"/>
-                </a:solidFill>
-              </a14:hiddenFill>
-            </a:ext>
-            <a:ext uri="{91240B29-F687-4F45-9708-019B960494DF}">
-              <a14:hiddenLine xmlns:a14="http://schemas.microsoft.com/office/drawing/2010/main" w="9525">
-                <a:solidFill>
-                  <a:srgbClr val="000000"/>
-                </a:solidFill>
-                <a:miter lim="800000"/>
-                <a:headEnd/>
-                <a:tailEnd/>
-              </a14:hiddenLine>
-            </a:ext>
-          </a:extLst>
-        </p:spPr>
-        <p:txBody>
-          <a:bodyPr/>
-          <a:lstStyle/>
-          <a:p>
-            <a:r>
-              <a:rPr lang="en-US" smtClean="0">
-                <a:latin typeface="Arial" panose="020B0604020202020204" pitchFamily="34" charset="0"/>
-              </a:rPr>
-              <a:t>Updates of the Boolean Theorems with the addition of DeMorgan’s</a:t>
-            </a:r>
-          </a:p>
-        </p:txBody>
-      </p:sp>
-      <p:sp>
-        <p:nvSpPr>
-          <p:cNvPr id="37892" name="Header Placeholder 3"/>
-          <p:cNvSpPr>
-            <a:spLocks noGrp="1"/>
-          </p:cNvSpPr>
-          <p:nvPr>
-            <p:ph type="hdr" sz="quarter"/>
-          </p:nvPr>
-        </p:nvSpPr>
-        <p:spPr>
-          <a:noFill/>
-          <a:ln/>
-          <a:extLst>
-            <a:ext uri="{909E8E84-426E-40DD-AFC4-6F175D3DCCD1}">
-              <a14:hiddenFill xmlns:a14="http://schemas.microsoft.com/office/drawing/2010/main">
-                <a:solidFill>
-                  <a:srgbClr val="FFFFFF"/>
-                </a:solidFill>
-              </a14:hiddenFill>
-            </a:ext>
-            <a:ext uri="{91240B29-F687-4F45-9708-019B960494DF}">
-              <a14:hiddenLine xmlns:a14="http://schemas.microsoft.com/office/drawing/2010/main" w="9525">
-                <a:solidFill>
-                  <a:srgbClr val="000000"/>
-                </a:solidFill>
-                <a:miter lim="800000"/>
-                <a:headEnd/>
-                <a:tailEnd/>
-              </a14:hiddenLine>
-            </a:ext>
-          </a:extLst>
-        </p:spPr>
-        <p:txBody>
-          <a:bodyPr/>
-          <a:lstStyle>
-            <a:lvl1pPr eaLnBrk="0" hangingPunct="0">
-              <a:defRPr>
-                <a:solidFill>
-                  <a:schemeClr val="tx1"/>
-                </a:solidFill>
-                <a:latin typeface="Arial" panose="020B0604020202020204" pitchFamily="34" charset="0"/>
-                <a:cs typeface="Arial" panose="020B0604020202020204" pitchFamily="34" charset="0"/>
-              </a:defRPr>
-            </a:lvl1pPr>
-            <a:lvl2pPr marL="742950" indent="-285750" eaLnBrk="0" hangingPunct="0">
-              <a:defRPr>
-                <a:solidFill>
-                  <a:schemeClr val="tx1"/>
-                </a:solidFill>
-                <a:latin typeface="Arial" panose="020B0604020202020204" pitchFamily="34" charset="0"/>
-                <a:cs typeface="Arial" panose="020B0604020202020204" pitchFamily="34" charset="0"/>
-              </a:defRPr>
-            </a:lvl2pPr>
-            <a:lvl3pPr marL="1143000" indent="-228600" eaLnBrk="0" hangingPunct="0">
-              <a:defRPr>
-                <a:solidFill>
-                  <a:schemeClr val="tx1"/>
-                </a:solidFill>
-                <a:latin typeface="Arial" panose="020B0604020202020204" pitchFamily="34" charset="0"/>
-                <a:cs typeface="Arial" panose="020B0604020202020204" pitchFamily="34" charset="0"/>
-              </a:defRPr>
-            </a:lvl3pPr>
-            <a:lvl4pPr marL="1600200" indent="-228600" eaLnBrk="0" hangingPunct="0">
-              <a:defRPr>
-                <a:solidFill>
-                  <a:schemeClr val="tx1"/>
-                </a:solidFill>
-                <a:latin typeface="Arial" panose="020B0604020202020204" pitchFamily="34" charset="0"/>
-                <a:cs typeface="Arial" panose="020B0604020202020204" pitchFamily="34" charset="0"/>
-              </a:defRPr>
-            </a:lvl4pPr>
-            <a:lvl5pPr marL="2057400" indent="-228600" eaLnBrk="0" hangingPunct="0">
-              <a:defRPr>
-                <a:solidFill>
-                  <a:schemeClr val="tx1"/>
-                </a:solidFill>
-                <a:latin typeface="Arial" panose="020B0604020202020204" pitchFamily="34" charset="0"/>
-                <a:cs typeface="Arial" panose="020B0604020202020204" pitchFamily="34" charset="0"/>
-              </a:defRPr>
-            </a:lvl5pPr>
-            <a:lvl6pPr marL="2514600" indent="-228600" eaLnBrk="0" fontAlgn="base" hangingPunct="0">
-              <a:spcBef>
-                <a:spcPct val="0"/>
-              </a:spcBef>
-              <a:spcAft>
-                <a:spcPct val="0"/>
-              </a:spcAft>
-              <a:defRPr>
-                <a:solidFill>
-                  <a:schemeClr val="tx1"/>
-                </a:solidFill>
-                <a:latin typeface="Arial" panose="020B0604020202020204" pitchFamily="34" charset="0"/>
-                <a:cs typeface="Arial" panose="020B0604020202020204" pitchFamily="34" charset="0"/>
-              </a:defRPr>
-            </a:lvl6pPr>
-            <a:lvl7pPr marL="2971800" indent="-228600" eaLnBrk="0" fontAlgn="base" hangingPunct="0">
-              <a:spcBef>
-                <a:spcPct val="0"/>
-              </a:spcBef>
-              <a:spcAft>
-                <a:spcPct val="0"/>
-              </a:spcAft>
-              <a:defRPr>
-                <a:solidFill>
-                  <a:schemeClr val="tx1"/>
-                </a:solidFill>
-                <a:latin typeface="Arial" panose="020B0604020202020204" pitchFamily="34" charset="0"/>
-                <a:cs typeface="Arial" panose="020B0604020202020204" pitchFamily="34" charset="0"/>
-              </a:defRPr>
-            </a:lvl7pPr>
-            <a:lvl8pPr marL="3429000" indent="-228600" eaLnBrk="0" fontAlgn="base" hangingPunct="0">
-              <a:spcBef>
-                <a:spcPct val="0"/>
-              </a:spcBef>
-              <a:spcAft>
-                <a:spcPct val="0"/>
-              </a:spcAft>
-              <a:defRPr>
-                <a:solidFill>
-                  <a:schemeClr val="tx1"/>
-                </a:solidFill>
-                <a:latin typeface="Arial" panose="020B0604020202020204" pitchFamily="34" charset="0"/>
-                <a:cs typeface="Arial" panose="020B0604020202020204" pitchFamily="34" charset="0"/>
-              </a:defRPr>
-            </a:lvl8pPr>
-            <a:lvl9pPr marL="3886200" indent="-228600" eaLnBrk="0" fontAlgn="base" hangingPunct="0">
-              <a:spcBef>
-                <a:spcPct val="0"/>
-              </a:spcBef>
-              <a:spcAft>
-                <a:spcPct val="0"/>
-              </a:spcAft>
-              <a:defRPr>
-                <a:solidFill>
-                  <a:schemeClr val="tx1"/>
-                </a:solidFill>
-                <a:latin typeface="Arial" panose="020B0604020202020204" pitchFamily="34" charset="0"/>
-                <a:cs typeface="Arial" panose="020B0604020202020204" pitchFamily="34" charset="0"/>
-              </a:defRPr>
-            </a:lvl9pPr>
-          </a:lstStyle>
-          <a:p>
-            <a:pPr eaLnBrk="1" hangingPunct="1"/>
-            <a:r>
-              <a:rPr lang="en-US" smtClean="0"/>
-              <a:t>DeMorgan’s Theorems</a:t>
-            </a:r>
-          </a:p>
-        </p:txBody>
-      </p:sp>
-      <p:sp>
-        <p:nvSpPr>
-          <p:cNvPr id="37893" name="Date Placeholder 4"/>
-          <p:cNvSpPr>
-            <a:spLocks noGrp="1"/>
-          </p:cNvSpPr>
-          <p:nvPr>
-            <p:ph type="dt" sz="quarter" idx="1"/>
-          </p:nvPr>
-        </p:nvSpPr>
-        <p:spPr>
-          <a:noFill/>
-          <a:ln/>
-          <a:extLst>
-            <a:ext uri="{909E8E84-426E-40DD-AFC4-6F175D3DCCD1}">
-              <a14:hiddenFill xmlns:a14="http://schemas.microsoft.com/office/drawing/2010/main">
-                <a:solidFill>
-                  <a:srgbClr val="FFFFFF"/>
-                </a:solidFill>
-              </a14:hiddenFill>
-            </a:ext>
-            <a:ext uri="{91240B29-F687-4F45-9708-019B960494DF}">
-              <a14:hiddenLine xmlns:a14="http://schemas.microsoft.com/office/drawing/2010/main" w="9525">
-                <a:solidFill>
-                  <a:srgbClr val="000000"/>
-                </a:solidFill>
-                <a:miter lim="800000"/>
-                <a:headEnd/>
-                <a:tailEnd/>
-              </a14:hiddenLine>
-            </a:ext>
-          </a:extLst>
-        </p:spPr>
-        <p:txBody>
-          <a:bodyPr/>
-          <a:lstStyle>
-            <a:lvl1pPr eaLnBrk="0" hangingPunct="0">
-              <a:defRPr>
-                <a:solidFill>
-                  <a:schemeClr val="tx1"/>
-                </a:solidFill>
-                <a:latin typeface="Arial" panose="020B0604020202020204" pitchFamily="34" charset="0"/>
-                <a:cs typeface="Arial" panose="020B0604020202020204" pitchFamily="34" charset="0"/>
-              </a:defRPr>
-            </a:lvl1pPr>
-            <a:lvl2pPr marL="742950" indent="-285750" eaLnBrk="0" hangingPunct="0">
-              <a:defRPr>
-                <a:solidFill>
-                  <a:schemeClr val="tx1"/>
-                </a:solidFill>
-                <a:latin typeface="Arial" panose="020B0604020202020204" pitchFamily="34" charset="0"/>
-                <a:cs typeface="Arial" panose="020B0604020202020204" pitchFamily="34" charset="0"/>
-              </a:defRPr>
-            </a:lvl2pPr>
-            <a:lvl3pPr marL="1143000" indent="-228600" eaLnBrk="0" hangingPunct="0">
-              <a:defRPr>
-                <a:solidFill>
-                  <a:schemeClr val="tx1"/>
-                </a:solidFill>
-                <a:latin typeface="Arial" panose="020B0604020202020204" pitchFamily="34" charset="0"/>
-                <a:cs typeface="Arial" panose="020B0604020202020204" pitchFamily="34" charset="0"/>
-              </a:defRPr>
-            </a:lvl3pPr>
-            <a:lvl4pPr marL="1600200" indent="-228600" eaLnBrk="0" hangingPunct="0">
-              <a:defRPr>
-                <a:solidFill>
-                  <a:schemeClr val="tx1"/>
-                </a:solidFill>
-                <a:latin typeface="Arial" panose="020B0604020202020204" pitchFamily="34" charset="0"/>
-                <a:cs typeface="Arial" panose="020B0604020202020204" pitchFamily="34" charset="0"/>
-              </a:defRPr>
-            </a:lvl4pPr>
-            <a:lvl5pPr marL="2057400" indent="-228600" eaLnBrk="0" hangingPunct="0">
-              <a:defRPr>
-                <a:solidFill>
-                  <a:schemeClr val="tx1"/>
-                </a:solidFill>
-                <a:latin typeface="Arial" panose="020B0604020202020204" pitchFamily="34" charset="0"/>
-                <a:cs typeface="Arial" panose="020B0604020202020204" pitchFamily="34" charset="0"/>
-              </a:defRPr>
-            </a:lvl5pPr>
-            <a:lvl6pPr marL="2514600" indent="-228600" eaLnBrk="0" fontAlgn="base" hangingPunct="0">
-              <a:spcBef>
-                <a:spcPct val="0"/>
-              </a:spcBef>
-              <a:spcAft>
-                <a:spcPct val="0"/>
-              </a:spcAft>
-              <a:defRPr>
-                <a:solidFill>
-                  <a:schemeClr val="tx1"/>
-                </a:solidFill>
-                <a:latin typeface="Arial" panose="020B0604020202020204" pitchFamily="34" charset="0"/>
-                <a:cs typeface="Arial" panose="020B0604020202020204" pitchFamily="34" charset="0"/>
-              </a:defRPr>
-            </a:lvl6pPr>
-            <a:lvl7pPr marL="2971800" indent="-228600" eaLnBrk="0" fontAlgn="base" hangingPunct="0">
-              <a:spcBef>
-                <a:spcPct val="0"/>
-              </a:spcBef>
-              <a:spcAft>
-                <a:spcPct val="0"/>
-              </a:spcAft>
-              <a:defRPr>
-                <a:solidFill>
-                  <a:schemeClr val="tx1"/>
-                </a:solidFill>
-                <a:latin typeface="Arial" panose="020B0604020202020204" pitchFamily="34" charset="0"/>
-                <a:cs typeface="Arial" panose="020B0604020202020204" pitchFamily="34" charset="0"/>
-              </a:defRPr>
-            </a:lvl7pPr>
-            <a:lvl8pPr marL="3429000" indent="-228600" eaLnBrk="0" fontAlgn="base" hangingPunct="0">
-              <a:spcBef>
-                <a:spcPct val="0"/>
-              </a:spcBef>
-              <a:spcAft>
-                <a:spcPct val="0"/>
-              </a:spcAft>
-              <a:defRPr>
-                <a:solidFill>
-                  <a:schemeClr val="tx1"/>
-                </a:solidFill>
-                <a:latin typeface="Arial" panose="020B0604020202020204" pitchFamily="34" charset="0"/>
-                <a:cs typeface="Arial" panose="020B0604020202020204" pitchFamily="34" charset="0"/>
-              </a:defRPr>
-            </a:lvl8pPr>
-            <a:lvl9pPr marL="3886200" indent="-228600" eaLnBrk="0" fontAlgn="base" hangingPunct="0">
-              <a:spcBef>
-                <a:spcPct val="0"/>
-              </a:spcBef>
-              <a:spcAft>
-                <a:spcPct val="0"/>
-              </a:spcAft>
-              <a:defRPr>
-                <a:solidFill>
-                  <a:schemeClr val="tx1"/>
-                </a:solidFill>
-                <a:latin typeface="Arial" panose="020B0604020202020204" pitchFamily="34" charset="0"/>
-                <a:cs typeface="Arial" panose="020B0604020202020204" pitchFamily="34" charset="0"/>
-              </a:defRPr>
-            </a:lvl9pPr>
-          </a:lstStyle>
-          <a:p>
-            <a:pPr eaLnBrk="1" hangingPunct="1"/>
-            <a:r>
-              <a:rPr lang="en-US" smtClean="0"/>
-              <a:t>Digital Electronics </a:t>
-            </a:r>
-            <a:r>
-              <a:rPr lang="en-US" smtClean="0">
-                <a:sym typeface="Symbol" panose="05050102010706020507" pitchFamily="18" charset="2"/>
-              </a:rPr>
-              <a:t></a:t>
-            </a:r>
-          </a:p>
-          <a:p>
-            <a:pPr eaLnBrk="1" hangingPunct="1"/>
-            <a:r>
-              <a:rPr lang="en-US" smtClean="0">
-                <a:sym typeface="Symbol" panose="05050102010706020507" pitchFamily="18" charset="2"/>
-              </a:rPr>
-              <a:t>2,1 Introduction to AOI Logic</a:t>
-            </a:r>
-            <a:endParaRPr lang="en-US" smtClean="0"/>
-          </a:p>
-        </p:txBody>
-      </p:sp>
-      <p:sp>
-        <p:nvSpPr>
-          <p:cNvPr id="37894" name="Footer Placeholder 5"/>
-          <p:cNvSpPr>
-            <a:spLocks noGrp="1"/>
-          </p:cNvSpPr>
-          <p:nvPr>
-            <p:ph type="ftr" sz="quarter" idx="4"/>
-          </p:nvPr>
-        </p:nvSpPr>
-        <p:spPr>
-          <a:noFill/>
-          <a:ln/>
-          <a:extLst>
-            <a:ext uri="{909E8E84-426E-40DD-AFC4-6F175D3DCCD1}">
-              <a14:hiddenFill xmlns:a14="http://schemas.microsoft.com/office/drawing/2010/main">
-                <a:solidFill>
-                  <a:srgbClr val="FFFFFF"/>
-                </a:solidFill>
-              </a14:hiddenFill>
-            </a:ext>
-            <a:ext uri="{91240B29-F687-4F45-9708-019B960494DF}">
-              <a14:hiddenLine xmlns:a14="http://schemas.microsoft.com/office/drawing/2010/main" w="9525">
-                <a:solidFill>
-                  <a:srgbClr val="000000"/>
-                </a:solidFill>
-                <a:miter lim="800000"/>
-                <a:headEnd/>
-                <a:tailEnd/>
-              </a14:hiddenLine>
-            </a:ext>
-          </a:extLst>
-        </p:spPr>
-        <p:txBody>
-          <a:bodyPr/>
-          <a:lstStyle>
-            <a:lvl1pPr eaLnBrk="0" hangingPunct="0">
-              <a:defRPr>
-                <a:solidFill>
-                  <a:schemeClr val="tx1"/>
-                </a:solidFill>
-                <a:latin typeface="Arial" panose="020B0604020202020204" pitchFamily="34" charset="0"/>
-                <a:cs typeface="Arial" panose="020B0604020202020204" pitchFamily="34" charset="0"/>
-              </a:defRPr>
-            </a:lvl1pPr>
-            <a:lvl2pPr marL="742950" indent="-285750" eaLnBrk="0" hangingPunct="0">
-              <a:defRPr>
-                <a:solidFill>
-                  <a:schemeClr val="tx1"/>
-                </a:solidFill>
-                <a:latin typeface="Arial" panose="020B0604020202020204" pitchFamily="34" charset="0"/>
-                <a:cs typeface="Arial" panose="020B0604020202020204" pitchFamily="34" charset="0"/>
-              </a:defRPr>
-            </a:lvl2pPr>
-            <a:lvl3pPr marL="1143000" indent="-228600" eaLnBrk="0" hangingPunct="0">
-              <a:defRPr>
-                <a:solidFill>
-                  <a:schemeClr val="tx1"/>
-                </a:solidFill>
-                <a:latin typeface="Arial" panose="020B0604020202020204" pitchFamily="34" charset="0"/>
-                <a:cs typeface="Arial" panose="020B0604020202020204" pitchFamily="34" charset="0"/>
-              </a:defRPr>
-            </a:lvl3pPr>
-            <a:lvl4pPr marL="1600200" indent="-228600" eaLnBrk="0" hangingPunct="0">
-              <a:defRPr>
-                <a:solidFill>
-                  <a:schemeClr val="tx1"/>
-                </a:solidFill>
-                <a:latin typeface="Arial" panose="020B0604020202020204" pitchFamily="34" charset="0"/>
-                <a:cs typeface="Arial" panose="020B0604020202020204" pitchFamily="34" charset="0"/>
-              </a:defRPr>
-            </a:lvl4pPr>
-            <a:lvl5pPr marL="2057400" indent="-228600" eaLnBrk="0" hangingPunct="0">
-              <a:defRPr>
-                <a:solidFill>
-                  <a:schemeClr val="tx1"/>
-                </a:solidFill>
-                <a:latin typeface="Arial" panose="020B0604020202020204" pitchFamily="34" charset="0"/>
-                <a:cs typeface="Arial" panose="020B0604020202020204" pitchFamily="34" charset="0"/>
-              </a:defRPr>
-            </a:lvl5pPr>
-            <a:lvl6pPr marL="2514600" indent="-228600" eaLnBrk="0" fontAlgn="base" hangingPunct="0">
-              <a:spcBef>
-                <a:spcPct val="0"/>
-              </a:spcBef>
-              <a:spcAft>
-                <a:spcPct val="0"/>
-              </a:spcAft>
-              <a:defRPr>
-                <a:solidFill>
-                  <a:schemeClr val="tx1"/>
-                </a:solidFill>
-                <a:latin typeface="Arial" panose="020B0604020202020204" pitchFamily="34" charset="0"/>
-                <a:cs typeface="Arial" panose="020B0604020202020204" pitchFamily="34" charset="0"/>
-              </a:defRPr>
-            </a:lvl6pPr>
-            <a:lvl7pPr marL="2971800" indent="-228600" eaLnBrk="0" fontAlgn="base" hangingPunct="0">
-              <a:spcBef>
-                <a:spcPct val="0"/>
-              </a:spcBef>
-              <a:spcAft>
-                <a:spcPct val="0"/>
-              </a:spcAft>
-              <a:defRPr>
-                <a:solidFill>
-                  <a:schemeClr val="tx1"/>
-                </a:solidFill>
-                <a:latin typeface="Arial" panose="020B0604020202020204" pitchFamily="34" charset="0"/>
-                <a:cs typeface="Arial" panose="020B0604020202020204" pitchFamily="34" charset="0"/>
-              </a:defRPr>
-            </a:lvl7pPr>
-            <a:lvl8pPr marL="3429000" indent="-228600" eaLnBrk="0" fontAlgn="base" hangingPunct="0">
-              <a:spcBef>
-                <a:spcPct val="0"/>
-              </a:spcBef>
-              <a:spcAft>
-                <a:spcPct val="0"/>
-              </a:spcAft>
-              <a:defRPr>
-                <a:solidFill>
-                  <a:schemeClr val="tx1"/>
-                </a:solidFill>
-                <a:latin typeface="Arial" panose="020B0604020202020204" pitchFamily="34" charset="0"/>
-                <a:cs typeface="Arial" panose="020B0604020202020204" pitchFamily="34" charset="0"/>
-              </a:defRPr>
-            </a:lvl8pPr>
-            <a:lvl9pPr marL="3886200" indent="-228600" eaLnBrk="0" fontAlgn="base" hangingPunct="0">
-              <a:spcBef>
-                <a:spcPct val="0"/>
-              </a:spcBef>
-              <a:spcAft>
-                <a:spcPct val="0"/>
-              </a:spcAft>
-              <a:defRPr>
-                <a:solidFill>
-                  <a:schemeClr val="tx1"/>
-                </a:solidFill>
-                <a:latin typeface="Arial" panose="020B0604020202020204" pitchFamily="34" charset="0"/>
-                <a:cs typeface="Arial" panose="020B0604020202020204" pitchFamily="34" charset="0"/>
-              </a:defRPr>
-            </a:lvl9pPr>
-          </a:lstStyle>
-          <a:p>
-            <a:pPr eaLnBrk="1" hangingPunct="1"/>
-            <a:r>
-              <a:rPr lang="en-US" smtClean="0"/>
-              <a:t>Project Lead The Way, Inc.</a:t>
-            </a:r>
-            <a:endParaRPr lang="en-US" baseline="30000" smtClean="0"/>
-          </a:p>
-          <a:p>
-            <a:pPr eaLnBrk="1" hangingPunct="1"/>
-            <a:r>
-              <a:rPr lang="en-US" smtClean="0"/>
-              <a:t>Copyright 2009</a:t>
-            </a:r>
-          </a:p>
-        </p:txBody>
-      </p:sp>
-      <p:sp>
-        <p:nvSpPr>
-          <p:cNvPr id="7" name="Slide Number Placeholder 6"/>
-          <p:cNvSpPr>
-            <a:spLocks noGrp="1"/>
-          </p:cNvSpPr>
-          <p:nvPr>
-            <p:ph type="sldNum" sz="quarter" idx="5"/>
-          </p:nvPr>
-        </p:nvSpPr>
-        <p:spPr/>
-        <p:txBody>
-          <a:bodyPr/>
-          <a:lstStyle>
-            <a:lvl1pPr eaLnBrk="0" hangingPunct="0">
-              <a:defRPr>
-                <a:solidFill>
-                  <a:schemeClr val="tx1"/>
-                </a:solidFill>
-                <a:latin typeface="Arial" panose="020B0604020202020204" pitchFamily="34" charset="0"/>
-                <a:cs typeface="Arial" panose="020B0604020202020204" pitchFamily="34" charset="0"/>
-              </a:defRPr>
-            </a:lvl1pPr>
-            <a:lvl2pPr marL="742950" indent="-285750" eaLnBrk="0" hangingPunct="0">
-              <a:defRPr>
-                <a:solidFill>
-                  <a:schemeClr val="tx1"/>
-                </a:solidFill>
-                <a:latin typeface="Arial" panose="020B0604020202020204" pitchFamily="34" charset="0"/>
-                <a:cs typeface="Arial" panose="020B0604020202020204" pitchFamily="34" charset="0"/>
-              </a:defRPr>
-            </a:lvl2pPr>
-            <a:lvl3pPr marL="1143000" indent="-228600" eaLnBrk="0" hangingPunct="0">
-              <a:defRPr>
-                <a:solidFill>
-                  <a:schemeClr val="tx1"/>
-                </a:solidFill>
-                <a:latin typeface="Arial" panose="020B0604020202020204" pitchFamily="34" charset="0"/>
-                <a:cs typeface="Arial" panose="020B0604020202020204" pitchFamily="34" charset="0"/>
-              </a:defRPr>
-            </a:lvl3pPr>
-            <a:lvl4pPr marL="1600200" indent="-228600" eaLnBrk="0" hangingPunct="0">
-              <a:defRPr>
-                <a:solidFill>
-                  <a:schemeClr val="tx1"/>
-                </a:solidFill>
-                <a:latin typeface="Arial" panose="020B0604020202020204" pitchFamily="34" charset="0"/>
-                <a:cs typeface="Arial" panose="020B0604020202020204" pitchFamily="34" charset="0"/>
-              </a:defRPr>
-            </a:lvl4pPr>
-            <a:lvl5pPr marL="2057400" indent="-228600" eaLnBrk="0" hangingPunct="0">
-              <a:defRPr>
-                <a:solidFill>
-                  <a:schemeClr val="tx1"/>
-                </a:solidFill>
-                <a:latin typeface="Arial" panose="020B0604020202020204" pitchFamily="34" charset="0"/>
-                <a:cs typeface="Arial" panose="020B0604020202020204" pitchFamily="34" charset="0"/>
-              </a:defRPr>
-            </a:lvl5pPr>
-            <a:lvl6pPr marL="2514600" indent="-228600" eaLnBrk="0" fontAlgn="base" hangingPunct="0">
-              <a:spcBef>
-                <a:spcPct val="0"/>
-              </a:spcBef>
-              <a:spcAft>
-                <a:spcPct val="0"/>
-              </a:spcAft>
-              <a:defRPr>
-                <a:solidFill>
-                  <a:schemeClr val="tx1"/>
-                </a:solidFill>
-                <a:latin typeface="Arial" panose="020B0604020202020204" pitchFamily="34" charset="0"/>
-                <a:cs typeface="Arial" panose="020B0604020202020204" pitchFamily="34" charset="0"/>
-              </a:defRPr>
-            </a:lvl6pPr>
-            <a:lvl7pPr marL="2971800" indent="-228600" eaLnBrk="0" fontAlgn="base" hangingPunct="0">
-              <a:spcBef>
-                <a:spcPct val="0"/>
-              </a:spcBef>
-              <a:spcAft>
-                <a:spcPct val="0"/>
-              </a:spcAft>
-              <a:defRPr>
-                <a:solidFill>
-                  <a:schemeClr val="tx1"/>
-                </a:solidFill>
-                <a:latin typeface="Arial" panose="020B0604020202020204" pitchFamily="34" charset="0"/>
-                <a:cs typeface="Arial" panose="020B0604020202020204" pitchFamily="34" charset="0"/>
-              </a:defRPr>
-            </a:lvl7pPr>
-            <a:lvl8pPr marL="3429000" indent="-228600" eaLnBrk="0" fontAlgn="base" hangingPunct="0">
-              <a:spcBef>
-                <a:spcPct val="0"/>
-              </a:spcBef>
-              <a:spcAft>
-                <a:spcPct val="0"/>
-              </a:spcAft>
-              <a:defRPr>
-                <a:solidFill>
-                  <a:schemeClr val="tx1"/>
-                </a:solidFill>
-                <a:latin typeface="Arial" panose="020B0604020202020204" pitchFamily="34" charset="0"/>
-                <a:cs typeface="Arial" panose="020B0604020202020204" pitchFamily="34" charset="0"/>
-              </a:defRPr>
-            </a:lvl8pPr>
-            <a:lvl9pPr marL="3886200" indent="-228600" eaLnBrk="0" fontAlgn="base" hangingPunct="0">
-              <a:spcBef>
-                <a:spcPct val="0"/>
-              </a:spcBef>
-              <a:spcAft>
-                <a:spcPct val="0"/>
-              </a:spcAft>
-              <a:defRPr>
-                <a:solidFill>
-                  <a:schemeClr val="tx1"/>
-                </a:solidFill>
-                <a:latin typeface="Arial" panose="020B0604020202020204" pitchFamily="34" charset="0"/>
-                <a:cs typeface="Arial" panose="020B0604020202020204" pitchFamily="34" charset="0"/>
-              </a:defRPr>
-            </a:lvl9pPr>
-          </a:lstStyle>
-          <a:p>
-            <a:pPr eaLnBrk="1" hangingPunct="1"/>
-            <a:fld id="{8CC6BA39-AC56-4E65-A4E8-CFDB16F84254}" type="slidenum">
-              <a:rPr lang="en-US"/>
-              <a:pPr eaLnBrk="1" hangingPunct="1"/>
-              <a:t>26</a:t>
-            </a:fld>
-            <a:endParaRPr lang="en-US"/>
-          </a:p>
-        </p:txBody>
-      </p:sp>
-    </p:spTree>
-    <p:extLst>
-      <p:ext uri="{BB962C8B-B14F-4D97-AF65-F5344CB8AC3E}">
-        <p14:creationId xmlns:p14="http://schemas.microsoft.com/office/powerpoint/2010/main" val="2853510881"/>
       </p:ext>
     </p:extLst>
   </p:cSld>
@@ -10905,6 +10802,13 @@
   <p:clrMapOvr>
     <a:masterClrMapping/>
   </p:clrMapOvr>
+  <p:timing>
+    <p:tnLst>
+      <p:par>
+        <p:cTn id="1" dur="indefinite" restart="never" nodeType="tmRoot"/>
+      </p:par>
+    </p:tnLst>
+  </p:timing>
 </p:sld>
 </file>
 
@@ -11675,7 +11579,7 @@
           <a:graphicData uri="http://schemas.openxmlformats.org/presentationml/2006/ole">
             <mc:AlternateContent xmlns:mc="http://schemas.openxmlformats.org/markup-compatibility/2006">
               <mc:Choice xmlns:v="urn:schemas-microsoft-com:vml" Requires="v">
-                <p:oleObj spid="_x0000_s80946" name="CorelDRAW" r:id="rId4" imgW="1340640" imgH="1167840" progId="">
+                <p:oleObj spid="_x0000_s80952" name="CorelDRAW" r:id="rId4" imgW="1340640" imgH="1167840" progId="">
                   <p:embed/>
                 </p:oleObj>
               </mc:Choice>
@@ -11774,7 +11678,7 @@
           <a:graphicData uri="http://schemas.openxmlformats.org/presentationml/2006/ole">
             <mc:AlternateContent xmlns:mc="http://schemas.openxmlformats.org/markup-compatibility/2006">
               <mc:Choice xmlns:v="urn:schemas-microsoft-com:vml" Requires="v">
-                <p:oleObj spid="_x0000_s80947" name="CorelDRAW" r:id="rId6" imgW="2564280" imgH="604080" progId="">
+                <p:oleObj spid="_x0000_s80953" name="CorelDRAW" r:id="rId6" imgW="2564280" imgH="604080" progId="">
                   <p:embed/>
                 </p:oleObj>
               </mc:Choice>
@@ -15045,7 +14949,7 @@
             <a:graphicData uri="http://schemas.openxmlformats.org/presentationml/2006/ole">
               <mc:AlternateContent xmlns:mc="http://schemas.openxmlformats.org/markup-compatibility/2006">
                 <mc:Choice xmlns:v="urn:schemas-microsoft-com:vml" Requires="v">
-                  <p:oleObj spid="_x0000_s81923" name="Equation" r:id="rId5" imgW="1079280" imgH="279360" progId="Equation.3">
+                  <p:oleObj spid="_x0000_s81926" name="Equation" r:id="rId5" imgW="1079280" imgH="279360" progId="Equation.3">
                     <p:embed/>
                   </p:oleObj>
                 </mc:Choice>
@@ -19900,6 +19804,13 @@
   <p:clrMapOvr>
     <a:masterClrMapping/>
   </p:clrMapOvr>
+  <p:timing>
+    <p:tnLst>
+      <p:par>
+        <p:cTn id="1" dur="indefinite" restart="never" nodeType="tmRoot"/>
+      </p:par>
+    </p:tnLst>
+  </p:timing>
 </p:sld>
 </file>
 
@@ -19983,6 +19894,13 @@
   <p:clrMapOvr>
     <a:masterClrMapping/>
   </p:clrMapOvr>
+  <p:timing>
+    <p:tnLst>
+      <p:par>
+        <p:cTn id="1" dur="indefinite" restart="never" nodeType="tmRoot"/>
+      </p:par>
+    </p:tnLst>
+  </p:timing>
 </p:sld>
 </file>
 
@@ -20844,6 +20762,13 @@
   <p:clrMapOvr>
     <a:masterClrMapping/>
   </p:clrMapOvr>
+  <p:timing>
+    <p:tnLst>
+      <p:par>
+        <p:cTn id="1" dur="indefinite" restart="never" nodeType="tmRoot"/>
+      </p:par>
+    </p:tnLst>
+  </p:timing>
 </p:sld>
 </file>
 
@@ -20891,7 +20816,6 @@
               <a:rPr lang="en-US" dirty="0" smtClean="0"/>
               <a:t>Create Two Logical Expressions for the truth tables </a:t>
             </a:r>
-            <a:endParaRPr lang="en-US" dirty="0" smtClean="0"/>
           </a:p>
         </p:txBody>
       </p:sp>
@@ -30671,308 +30595,6 @@
 </file>
 
 <file path=ppt/slides/slide23.xml><?xml version="1.0" encoding="utf-8"?>
-<p:sld xmlns:a="http://schemas.openxmlformats.org/drawingml/2006/main" xmlns:r="http://schemas.openxmlformats.org/officeDocument/2006/relationships" xmlns:p="http://schemas.openxmlformats.org/presentationml/2006/main" showMasterPhAnim="0">
-  <p:cSld>
-    <p:spTree>
-      <p:nvGrpSpPr>
-        <p:cNvPr id="1" name=""/>
-        <p:cNvGrpSpPr/>
-        <p:nvPr/>
-      </p:nvGrpSpPr>
-      <p:grpSpPr>
-        <a:xfrm>
-          <a:off x="0" y="0"/>
-          <a:ext cx="0" cy="0"/>
-          <a:chOff x="0" y="0"/>
-          <a:chExt cx="0" cy="0"/>
-        </a:xfrm>
-      </p:grpSpPr>
-      <p:sp>
-        <p:nvSpPr>
-          <p:cNvPr id="18434" name="Rectangle 4"/>
-          <p:cNvSpPr>
-            <a:spLocks noChangeArrowheads="1"/>
-          </p:cNvSpPr>
-          <p:nvPr/>
-        </p:nvSpPr>
-        <p:spPr bwMode="auto">
-          <a:xfrm>
-            <a:off x="914400" y="1143000"/>
-            <a:ext cx="7374070" cy="461665"/>
-          </a:xfrm>
-          <a:prstGeom prst="rect">
-            <a:avLst/>
-          </a:prstGeom>
-          <a:solidFill>
-            <a:srgbClr val="996633"/>
-          </a:solidFill>
-          <a:ln w="9525">
-            <a:solidFill>
-              <a:srgbClr val="000000"/>
-            </a:solidFill>
-            <a:miter lim="800000"/>
-            <a:headEnd/>
-            <a:tailEnd/>
-          </a:ln>
-        </p:spPr>
-        <p:txBody>
-          <a:bodyPr wrap="none">
-            <a:spAutoFit/>
-          </a:bodyPr>
-          <a:lstStyle/>
-          <a:p>
-            <a:r>
-              <a:rPr lang="en-US" sz="2400" dirty="0" smtClean="0">
-                <a:solidFill>
-                  <a:srgbClr val="FFFF99"/>
-                </a:solidFill>
-                <a:latin typeface="Times New Roman" pitchFamily="18" charset="0"/>
-              </a:rPr>
-              <a:t>REVIEW: Writing </a:t>
-            </a:r>
-            <a:r>
-              <a:rPr lang="en-US" sz="2400" dirty="0">
-                <a:solidFill>
-                  <a:srgbClr val="FFFF99"/>
-                </a:solidFill>
-                <a:latin typeface="Times New Roman" pitchFamily="18" charset="0"/>
-              </a:rPr>
-              <a:t>the SOP </a:t>
-            </a:r>
-            <a:r>
-              <a:rPr lang="en-US" sz="2400" dirty="0" smtClean="0">
-                <a:solidFill>
-                  <a:srgbClr val="FFFF99"/>
-                </a:solidFill>
-                <a:latin typeface="Times New Roman" pitchFamily="18" charset="0"/>
-              </a:rPr>
-              <a:t>Expression </a:t>
-            </a:r>
-            <a:r>
-              <a:rPr lang="en-US" sz="2400" dirty="0">
-                <a:solidFill>
-                  <a:srgbClr val="FFFF99"/>
-                </a:solidFill>
-                <a:latin typeface="Times New Roman" pitchFamily="18" charset="0"/>
-              </a:rPr>
-              <a:t>for any Truth Table</a:t>
-            </a:r>
-          </a:p>
-        </p:txBody>
-      </p:sp>
-      <p:sp>
-        <p:nvSpPr>
-          <p:cNvPr id="18435" name="Text Box 5"/>
-          <p:cNvSpPr txBox="1">
-            <a:spLocks noChangeArrowheads="1"/>
-          </p:cNvSpPr>
-          <p:nvPr/>
-        </p:nvSpPr>
-        <p:spPr bwMode="auto">
-          <a:xfrm>
-            <a:off x="914400" y="1752600"/>
-            <a:ext cx="7543800" cy="3785652"/>
-          </a:xfrm>
-          <a:prstGeom prst="rect">
-            <a:avLst/>
-          </a:prstGeom>
-          <a:noFill/>
-          <a:ln w="9525">
-            <a:noFill/>
-            <a:miter lim="800000"/>
-            <a:headEnd/>
-            <a:tailEnd/>
-          </a:ln>
-        </p:spPr>
-        <p:txBody>
-          <a:bodyPr>
-            <a:spAutoFit/>
-          </a:bodyPr>
-          <a:lstStyle/>
-          <a:p>
-            <a:pPr eaLnBrk="0" hangingPunct="0">
-              <a:spcBef>
-                <a:spcPct val="50000"/>
-              </a:spcBef>
-            </a:pPr>
-            <a:r>
-              <a:rPr lang="en-US" sz="2400" dirty="0" smtClean="0">
-                <a:latin typeface="Times New Roman" pitchFamily="18" charset="0"/>
-              </a:rPr>
-              <a:t>Given the truth table for a expression, it’s easy to write an SOP-form expression for that expression.</a:t>
-            </a:r>
-          </a:p>
-          <a:p>
-            <a:pPr eaLnBrk="0" hangingPunct="0">
-              <a:spcBef>
-                <a:spcPct val="50000"/>
-              </a:spcBef>
-            </a:pPr>
-            <a:r>
-              <a:rPr lang="en-US" sz="2400" b="1" dirty="0" smtClean="0">
-                <a:latin typeface="Times New Roman" pitchFamily="18" charset="0"/>
-              </a:rPr>
-              <a:t>Step </a:t>
-            </a:r>
-            <a:r>
-              <a:rPr lang="en-US" sz="2400" b="1" dirty="0">
-                <a:latin typeface="Times New Roman" pitchFamily="18" charset="0"/>
-              </a:rPr>
-              <a:t>1. </a:t>
-            </a:r>
-            <a:r>
-              <a:rPr lang="en-US" sz="2400" dirty="0" smtClean="0">
-                <a:latin typeface="Times New Roman" pitchFamily="18" charset="0"/>
-              </a:rPr>
-              <a:t>For each of the truth table’s rows with a 1 in the output column, list the corresponding product term of the input variables.  </a:t>
-            </a:r>
-          </a:p>
-          <a:p>
-            <a:pPr eaLnBrk="0" hangingPunct="0">
-              <a:spcBef>
-                <a:spcPct val="50000"/>
-              </a:spcBef>
-            </a:pPr>
-            <a:r>
-              <a:rPr lang="en-US" sz="2400" b="1" dirty="0" smtClean="0">
-                <a:latin typeface="Times New Roman" pitchFamily="18" charset="0"/>
-              </a:rPr>
-              <a:t>Step 2. </a:t>
-            </a:r>
-            <a:r>
-              <a:rPr lang="en-US" sz="2400" dirty="0">
-                <a:latin typeface="Times New Roman" pitchFamily="18" charset="0"/>
-              </a:rPr>
-              <a:t>Add all of the product terms from Step </a:t>
-            </a:r>
-            <a:r>
-              <a:rPr lang="en-US" sz="2400" dirty="0" smtClean="0">
-                <a:latin typeface="Times New Roman" pitchFamily="18" charset="0"/>
-              </a:rPr>
-              <a:t>1.</a:t>
-            </a:r>
-          </a:p>
-          <a:p>
-            <a:pPr eaLnBrk="0" hangingPunct="0">
-              <a:spcBef>
-                <a:spcPct val="50000"/>
-              </a:spcBef>
-            </a:pPr>
-            <a:endParaRPr lang="en-US" sz="2400" dirty="0" smtClean="0">
-              <a:latin typeface="Times New Roman" pitchFamily="18" charset="0"/>
-            </a:endParaRPr>
-          </a:p>
-          <a:p>
-            <a:pPr eaLnBrk="0" hangingPunct="0">
-              <a:spcBef>
-                <a:spcPct val="50000"/>
-              </a:spcBef>
-            </a:pPr>
-            <a:r>
-              <a:rPr lang="en-US" sz="2400" dirty="0" smtClean="0">
-                <a:latin typeface="Times New Roman" pitchFamily="18" charset="0"/>
-              </a:rPr>
-              <a:t>See example on next slide…</a:t>
-            </a:r>
-            <a:endParaRPr lang="en-US" sz="2400" dirty="0">
-              <a:latin typeface="Times New Roman" pitchFamily="18" charset="0"/>
-            </a:endParaRPr>
-          </a:p>
-        </p:txBody>
-      </p:sp>
-    </p:spTree>
-    <p:extLst>
-      <p:ext uri="{BB962C8B-B14F-4D97-AF65-F5344CB8AC3E}">
-        <p14:creationId xmlns:p14="http://schemas.microsoft.com/office/powerpoint/2010/main" val="423637043"/>
-      </p:ext>
-    </p:extLst>
-  </p:cSld>
-  <p:clrMapOvr>
-    <a:masterClrMapping/>
-  </p:clrMapOvr>
-  <p:timing>
-    <p:tnLst>
-      <p:par>
-        <p:cTn id="1" dur="indefinite" restart="never" nodeType="tmRoot">
-          <p:childTnLst>
-            <p:seq concurrent="1" nextAc="seek">
-              <p:cTn id="2" dur="indefinite" nodeType="mainSeq">
-                <p:childTnLst>
-                  <p:par>
-                    <p:cTn id="3" fill="hold">
-                      <p:stCondLst>
-                        <p:cond delay="indefinite"/>
-                      </p:stCondLst>
-                      <p:childTnLst>
-                        <p:par>
-                          <p:cTn id="4" fill="hold">
-                            <p:stCondLst>
-                              <p:cond delay="0"/>
-                            </p:stCondLst>
-                            <p:childTnLst>
-                              <p:par>
-                                <p:cTn id="5" presetID="1" presetClass="entr" presetSubtype="0" fill="hold" nodeType="clickEffect">
-                                  <p:stCondLst>
-                                    <p:cond delay="0"/>
-                                  </p:stCondLst>
-                                  <p:childTnLst>
-                                    <p:set>
-                                      <p:cBhvr>
-                                        <p:cTn id="6" dur="1" fill="hold">
-                                          <p:stCondLst>
-                                            <p:cond delay="0"/>
-                                          </p:stCondLst>
-                                        </p:cTn>
-                                        <p:tgtEl>
-                                          <p:spTgt spid="18435">
-                                            <p:txEl>
-                                              <p:pRg st="4" end="4"/>
-                                            </p:txEl>
-                                          </p:spTgt>
-                                        </p:tgtEl>
-                                        <p:attrNameLst>
-                                          <p:attrName>style.visibility</p:attrName>
-                                        </p:attrNameLst>
-                                      </p:cBhvr>
-                                      <p:to>
-                                        <p:strVal val="visible"/>
-                                      </p:to>
-                                    </p:set>
-                                  </p:childTnLst>
-                                </p:cTn>
-                              </p:par>
-                            </p:childTnLst>
-                          </p:cTn>
-                        </p:par>
-                      </p:childTnLst>
-                    </p:cTn>
-                  </p:par>
-                </p:childTnLst>
-              </p:cTn>
-              <p:prevCondLst>
-                <p:cond evt="onPrev" delay="0">
-                  <p:tgtEl>
-                    <p:sldTgt/>
-                  </p:tgtEl>
-                </p:cond>
-              </p:prevCondLst>
-              <p:nextCondLst>
-                <p:cond evt="onNext" delay="0">
-                  <p:tgtEl>
-                    <p:sldTgt/>
-                  </p:tgtEl>
-                </p:cond>
-              </p:nextCondLst>
-            </p:seq>
-          </p:childTnLst>
-        </p:cTn>
-      </p:par>
-    </p:tnLst>
-  </p:timing>
-</p:sld>
-</file>
-
-<file path=ppt/slides/slide24.xml><?xml version="1.0" encoding="utf-8"?>
 <p:sld xmlns:a="http://schemas.openxmlformats.org/drawingml/2006/main" xmlns:r="http://schemas.openxmlformats.org/officeDocument/2006/relationships" xmlns:p="http://schemas.openxmlformats.org/presentationml/2006/main">
   <p:cSld>
     <p:spTree>
@@ -31048,10 +30670,17 @@
   <p:clrMapOvr>
     <a:masterClrMapping/>
   </p:clrMapOvr>
+  <p:timing>
+    <p:tnLst>
+      <p:par>
+        <p:cTn id="1" dur="indefinite" restart="never" nodeType="tmRoot"/>
+      </p:par>
+    </p:tnLst>
+  </p:timing>
 </p:sld>
 </file>
 
-<file path=ppt/slides/slide25.xml><?xml version="1.0" encoding="utf-8"?>
+<file path=ppt/slides/slide24.xml><?xml version="1.0" encoding="utf-8"?>
 <p:sld xmlns:a="http://schemas.openxmlformats.org/drawingml/2006/main" xmlns:r="http://schemas.openxmlformats.org/officeDocument/2006/relationships" xmlns:p="http://schemas.openxmlformats.org/presentationml/2006/main">
   <p:cSld>
     <p:spTree>
@@ -31135,10 +30764,17 @@
   <p:clrMapOvr>
     <a:masterClrMapping/>
   </p:clrMapOvr>
+  <p:timing>
+    <p:tnLst>
+      <p:par>
+        <p:cTn id="1" dur="indefinite" restart="never" nodeType="tmRoot"/>
+      </p:par>
+    </p:tnLst>
+  </p:timing>
 </p:sld>
 </file>
 
-<file path=ppt/slides/slide26.xml><?xml version="1.0" encoding="utf-8"?>
+<file path=ppt/slides/slide25.xml><?xml version="1.0" encoding="utf-8"?>
 <p:sld xmlns:a="http://schemas.openxmlformats.org/drawingml/2006/main" xmlns:r="http://schemas.openxmlformats.org/officeDocument/2006/relationships" xmlns:p="http://schemas.openxmlformats.org/presentationml/2006/main">
   <p:cSld>
     <p:spTree>
@@ -31199,7 +30835,7 @@
           <a:graphicData uri="http://schemas.openxmlformats.org/presentationml/2006/ole">
             <mc:AlternateContent xmlns:mc="http://schemas.openxmlformats.org/markup-compatibility/2006">
               <mc:Choice xmlns:v="urn:schemas-microsoft-com:vml" Requires="v">
-                <p:oleObj spid="_x0000_s82946" name="Equation" r:id="rId4" imgW="1269720" imgH="3288960" progId="Equation.3">
+                <p:oleObj spid="_x0000_s82952" name="Equation" r:id="rId4" imgW="1269720" imgH="3288960" progId="Equation.3">
                   <p:embed/>
                 </p:oleObj>
               </mc:Choice>
@@ -31292,7 +30928,7 @@
           <a:graphicData uri="http://schemas.openxmlformats.org/presentationml/2006/ole">
             <mc:AlternateContent xmlns:mc="http://schemas.openxmlformats.org/markup-compatibility/2006">
               <mc:Choice xmlns:v="urn:schemas-microsoft-com:vml" Requires="v">
-                <p:oleObj spid="_x0000_s82947" name="Equation" r:id="rId6" imgW="3962160" imgH="4444920" progId="Equation.3">
+                <p:oleObj spid="_x0000_s82953" name="Equation" r:id="rId6" imgW="3962160" imgH="4444920" progId="Equation.3">
                   <p:embed/>
                 </p:oleObj>
               </mc:Choice>
@@ -32719,12 +32355,36 @@
             <a:fld id="{7C4A4D23-ACED-4B97-AE5A-AA34026E0044}" type="slidenum">
               <a:rPr lang="en-US"/>
               <a:pPr eaLnBrk="1" hangingPunct="1"/>
-              <a:t>26</a:t>
+              <a:t>25</a:t>
             </a:fld>
             <a:endParaRPr lang="en-US"/>
           </a:p>
         </p:txBody>
       </p:sp>
+      <p:pic>
+        <p:nvPicPr>
+          <p:cNvPr id="2" name="Picture 1"/>
+          <p:cNvPicPr>
+            <a:picLocks noChangeAspect="1"/>
+          </p:cNvPicPr>
+          <p:nvPr/>
+        </p:nvPicPr>
+        <p:blipFill>
+          <a:blip r:embed="rId8"/>
+          <a:stretch>
+            <a:fillRect/>
+          </a:stretch>
+        </p:blipFill>
+        <p:spPr>
+          <a:xfrm>
+            <a:off x="140620" y="5986740"/>
+            <a:ext cx="2178051" cy="313550"/>
+          </a:xfrm>
+          <a:prstGeom prst="rect">
+            <a:avLst/>
+          </a:prstGeom>
+        </p:spPr>
+      </p:pic>
     </p:spTree>
     <p:extLst>
       <p:ext uri="{BB962C8B-B14F-4D97-AF65-F5344CB8AC3E}">
@@ -35045,7 +34705,7 @@
         </p:nvGrpSpPr>
         <p:grpSpPr bwMode="auto">
           <a:xfrm>
-            <a:off x="4267200" y="2438400"/>
+            <a:off x="4279900" y="2405063"/>
             <a:ext cx="2362200" cy="457200"/>
             <a:chOff x="816" y="2304"/>
             <a:chExt cx="1488" cy="288"/>
@@ -35459,119 +35119,249 @@
           </p:txBody>
         </p:sp>
       </p:grpSp>
-      <p:grpSp>
-        <p:nvGrpSpPr>
-          <p:cNvPr id="5" name="Group 22"/>
-          <p:cNvGrpSpPr>
-            <a:grpSpLocks/>
-          </p:cNvGrpSpPr>
+      <p:sp>
+        <p:nvSpPr>
+          <p:cNvPr id="13328" name="Line 24"/>
+          <p:cNvSpPr>
+            <a:spLocks noChangeShapeType="1"/>
+          </p:cNvSpPr>
           <p:nvPr/>
-        </p:nvGrpSpPr>
-        <p:grpSpPr bwMode="auto">
+        </p:nvSpPr>
+        <p:spPr bwMode="auto">
           <a:xfrm>
-            <a:off x="4191000" y="3810000"/>
-            <a:ext cx="2819400" cy="457200"/>
-            <a:chOff x="2640" y="2448"/>
-            <a:chExt cx="1776" cy="288"/>
+            <a:off x="5948364" y="506976"/>
+            <a:ext cx="152400" cy="0"/>
           </a:xfrm>
-        </p:grpSpPr>
-        <p:sp>
-          <p:nvSpPr>
-            <p:cNvPr id="13327" name="Text Box 23"/>
-            <p:cNvSpPr txBox="1">
-              <a:spLocks noChangeArrowheads="1"/>
-            </p:cNvSpPr>
-            <p:nvPr/>
-          </p:nvSpPr>
-          <p:spPr bwMode="auto">
-            <a:xfrm>
-              <a:off x="2640" y="2448"/>
-              <a:ext cx="1776" cy="288"/>
-            </a:xfrm>
-            <a:prstGeom prst="rect">
-              <a:avLst/>
-            </a:prstGeom>
+          <a:prstGeom prst="line">
+            <a:avLst/>
+          </a:prstGeom>
+          <a:noFill/>
+          <a:ln w="9525">
+            <a:solidFill>
+              <a:schemeClr val="tx2"/>
+            </a:solidFill>
+            <a:round/>
+            <a:headEnd/>
+            <a:tailEnd/>
+          </a:ln>
+        </p:spPr>
+        <p:txBody>
+          <a:bodyPr/>
+          <a:lstStyle/>
+          <a:p>
+            <a:endParaRPr lang="en-US"/>
+          </a:p>
+        </p:txBody>
+      </p:sp>
+      <p:sp>
+        <p:nvSpPr>
+          <p:cNvPr id="22" name="Text Box 23"/>
+          <p:cNvSpPr txBox="1">
+            <a:spLocks noChangeArrowheads="1"/>
+          </p:cNvSpPr>
+          <p:nvPr/>
+        </p:nvSpPr>
+        <p:spPr bwMode="auto">
+          <a:xfrm>
+            <a:off x="4089400" y="3868887"/>
+            <a:ext cx="4038600" cy="461665"/>
+          </a:xfrm>
+          <a:prstGeom prst="rect">
+            <a:avLst/>
+          </a:prstGeom>
+          <a:noFill/>
+          <a:ln w="9525">
             <a:noFill/>
-            <a:ln w="9525">
-              <a:noFill/>
-              <a:miter lim="800000"/>
-              <a:headEnd/>
-              <a:tailEnd/>
-            </a:ln>
-          </p:spPr>
-          <p:txBody>
-            <a:bodyPr>
-              <a:spAutoFit/>
-            </a:bodyPr>
-            <a:lstStyle/>
-            <a:p>
-              <a:pPr eaLnBrk="0" hangingPunct="0">
-                <a:spcBef>
-                  <a:spcPct val="50000"/>
-                </a:spcBef>
-              </a:pPr>
-              <a:r>
-                <a:rPr lang="en-US" sz="2400" smtClean="0">
-                  <a:solidFill>
-                    <a:schemeClr val="tx2"/>
-                  </a:solidFill>
-                  <a:latin typeface="Times New Roman" pitchFamily="18" charset="0"/>
-                </a:rPr>
-                <a:t>10.</a:t>
-              </a:r>
-              <a:r>
-                <a:rPr lang="en-US" sz="2400" smtClean="0">
-                  <a:latin typeface="Times New Roman" pitchFamily="18" charset="0"/>
-                </a:rPr>
-                <a:t>  </a:t>
-              </a:r>
-              <a:r>
-                <a:rPr lang="en-US" sz="2400" i="1">
-                  <a:solidFill>
-                    <a:schemeClr val="tx2"/>
-                  </a:solidFill>
-                  <a:latin typeface="Times New Roman" pitchFamily="18" charset="0"/>
-                </a:rPr>
-                <a:t>A + AB = A + B</a:t>
-              </a:r>
-            </a:p>
-          </p:txBody>
-        </p:sp>
-        <p:sp>
-          <p:nvSpPr>
-            <p:cNvPr id="13328" name="Line 24"/>
-            <p:cNvSpPr>
-              <a:spLocks noChangeShapeType="1"/>
-            </p:cNvSpPr>
-            <p:nvPr/>
-          </p:nvSpPr>
-          <p:spPr bwMode="auto">
-            <a:xfrm>
-              <a:off x="3408" y="2496"/>
-              <a:ext cx="96" cy="0"/>
-            </a:xfrm>
-            <a:prstGeom prst="line">
-              <a:avLst/>
-            </a:prstGeom>
-            <a:noFill/>
-            <a:ln w="9525">
+            <a:miter lim="800000"/>
+            <a:headEnd/>
+            <a:tailEnd/>
+          </a:ln>
+        </p:spPr>
+        <p:txBody>
+          <a:bodyPr wrap="square">
+            <a:spAutoFit/>
+          </a:bodyPr>
+          <a:lstStyle/>
+          <a:p>
+            <a:pPr eaLnBrk="0" hangingPunct="0">
+              <a:spcBef>
+                <a:spcPct val="50000"/>
+              </a:spcBef>
+            </a:pPr>
+            <a:r>
+              <a:rPr lang="en-US" sz="2400" dirty="0" smtClean="0">
+                <a:solidFill>
+                  <a:schemeClr val="tx2"/>
+                </a:solidFill>
+                <a:latin typeface="Times New Roman" pitchFamily="18" charset="0"/>
+              </a:rPr>
+              <a:t>10.</a:t>
+            </a:r>
+            <a:r>
+              <a:rPr lang="en-US" sz="2400" dirty="0" smtClean="0">
+                <a:latin typeface="Times New Roman" pitchFamily="18" charset="0"/>
+              </a:rPr>
+              <a:t>  </a:t>
+            </a:r>
+            <a:r>
+              <a:rPr lang="en-US" sz="2400" i="1" dirty="0">
+                <a:solidFill>
+                  <a:schemeClr val="tx2"/>
+                </a:solidFill>
+                <a:latin typeface="Times New Roman" pitchFamily="18" charset="0"/>
+              </a:rPr>
+              <a:t>A + </a:t>
+            </a:r>
+            <a:r>
+              <a:rPr lang="en-US" sz="2400" i="1" dirty="0" smtClean="0">
+                <a:solidFill>
+                  <a:schemeClr val="tx2"/>
+                </a:solidFill>
+                <a:latin typeface="Times New Roman" pitchFamily="18" charset="0"/>
+              </a:rPr>
+              <a:t>BC </a:t>
+            </a:r>
+            <a:r>
+              <a:rPr lang="en-US" sz="2400" i="1" dirty="0">
+                <a:solidFill>
+                  <a:schemeClr val="tx2"/>
+                </a:solidFill>
+                <a:latin typeface="Times New Roman" pitchFamily="18" charset="0"/>
+              </a:rPr>
+              <a:t>= </a:t>
+            </a:r>
+            <a:r>
+              <a:rPr lang="en-US" sz="2400" i="1" dirty="0" smtClean="0">
+                <a:solidFill>
+                  <a:schemeClr val="tx2"/>
+                </a:solidFill>
+                <a:latin typeface="Times New Roman" pitchFamily="18" charset="0"/>
+              </a:rPr>
+              <a:t>(A </a:t>
+            </a:r>
+            <a:r>
+              <a:rPr lang="en-US" sz="2400" i="1" dirty="0">
+                <a:solidFill>
+                  <a:schemeClr val="tx2"/>
+                </a:solidFill>
+                <a:latin typeface="Times New Roman" pitchFamily="18" charset="0"/>
+              </a:rPr>
+              <a:t>+ </a:t>
+            </a:r>
+            <a:r>
+              <a:rPr lang="en-US" sz="2400" i="1" dirty="0" smtClean="0">
+                <a:solidFill>
+                  <a:schemeClr val="tx2"/>
+                </a:solidFill>
+                <a:latin typeface="Times New Roman" pitchFamily="18" charset="0"/>
+              </a:rPr>
+              <a:t>B) (A + C)</a:t>
+            </a:r>
+            <a:endParaRPr lang="en-US" sz="2400" i="1" dirty="0">
               <a:solidFill>
                 <a:schemeClr val="tx2"/>
               </a:solidFill>
-              <a:round/>
-              <a:headEnd/>
-              <a:tailEnd/>
-            </a:ln>
-          </p:spPr>
-          <p:txBody>
-            <a:bodyPr/>
-            <a:lstStyle/>
-            <a:p>
-              <a:endParaRPr lang="en-US"/>
-            </a:p>
-          </p:txBody>
-        </p:sp>
-      </p:grpSp>
+              <a:latin typeface="Times New Roman" pitchFamily="18" charset="0"/>
+            </a:endParaRPr>
+          </a:p>
+        </p:txBody>
+      </p:sp>
+      <p:sp>
+        <p:nvSpPr>
+          <p:cNvPr id="24" name="Text Box 23"/>
+          <p:cNvSpPr txBox="1">
+            <a:spLocks noChangeArrowheads="1"/>
+          </p:cNvSpPr>
+          <p:nvPr/>
+        </p:nvSpPr>
+        <p:spPr bwMode="auto">
+          <a:xfrm>
+            <a:off x="4089400" y="4659094"/>
+            <a:ext cx="2819400" cy="457200"/>
+          </a:xfrm>
+          <a:prstGeom prst="rect">
+            <a:avLst/>
+          </a:prstGeom>
+          <a:noFill/>
+          <a:ln w="9525">
+            <a:noFill/>
+            <a:miter lim="800000"/>
+            <a:headEnd/>
+            <a:tailEnd/>
+          </a:ln>
+        </p:spPr>
+        <p:txBody>
+          <a:bodyPr>
+            <a:spAutoFit/>
+          </a:bodyPr>
+          <a:lstStyle/>
+          <a:p>
+            <a:pPr eaLnBrk="0" hangingPunct="0">
+              <a:spcBef>
+                <a:spcPct val="50000"/>
+              </a:spcBef>
+            </a:pPr>
+            <a:r>
+              <a:rPr lang="en-US" sz="2400" dirty="0" smtClean="0">
+                <a:solidFill>
+                  <a:schemeClr val="tx2"/>
+                </a:solidFill>
+                <a:latin typeface="Times New Roman" pitchFamily="18" charset="0"/>
+              </a:rPr>
+              <a:t>11.</a:t>
+            </a:r>
+            <a:r>
+              <a:rPr lang="en-US" sz="2400" dirty="0" smtClean="0">
+                <a:latin typeface="Times New Roman" pitchFamily="18" charset="0"/>
+              </a:rPr>
+              <a:t>  </a:t>
+            </a:r>
+            <a:r>
+              <a:rPr lang="en-US" sz="2400" i="1" dirty="0">
+                <a:solidFill>
+                  <a:schemeClr val="tx2"/>
+                </a:solidFill>
+                <a:latin typeface="Times New Roman" pitchFamily="18" charset="0"/>
+              </a:rPr>
+              <a:t>A + AB = A + B</a:t>
+            </a:r>
+          </a:p>
+        </p:txBody>
+      </p:sp>
+      <p:sp>
+        <p:nvSpPr>
+          <p:cNvPr id="27" name="Line 16"/>
+          <p:cNvSpPr>
+            <a:spLocks noChangeShapeType="1"/>
+          </p:cNvSpPr>
+          <p:nvPr/>
+        </p:nvSpPr>
+        <p:spPr bwMode="auto">
+          <a:xfrm>
+            <a:off x="5334000" y="4703226"/>
+            <a:ext cx="165100" cy="1588"/>
+          </a:xfrm>
+          <a:prstGeom prst="line">
+            <a:avLst/>
+          </a:prstGeom>
+          <a:noFill/>
+          <a:ln w="9525">
+            <a:solidFill>
+              <a:schemeClr val="tx2"/>
+            </a:solidFill>
+            <a:round/>
+            <a:headEnd/>
+            <a:tailEnd/>
+          </a:ln>
+        </p:spPr>
+        <p:txBody>
+          <a:bodyPr/>
+          <a:lstStyle/>
+          <a:p>
+            <a:endParaRPr lang="en-US"/>
+          </a:p>
+        </p:txBody>
+      </p:sp>
     </p:spTree>
   </p:cSld>
   <p:clrMapOvr>
@@ -36267,97 +36057,6 @@
                       </p:childTnLst>
                     </p:cTn>
                   </p:par>
-                  <p:par>
-                    <p:cTn id="49" fill="hold">
-                      <p:stCondLst>
-                        <p:cond delay="indefinite"/>
-                      </p:stCondLst>
-                      <p:childTnLst>
-                        <p:par>
-                          <p:cTn id="50" fill="hold">
-                            <p:stCondLst>
-                              <p:cond delay="0"/>
-                            </p:stCondLst>
-                            <p:childTnLst>
-                              <p:par>
-                                <p:cTn id="51" presetID="2" presetClass="entr" presetSubtype="4" fill="hold" nodeType="clickEffect">
-                                  <p:stCondLst>
-                                    <p:cond delay="0"/>
-                                  </p:stCondLst>
-                                  <p:childTnLst>
-                                    <p:set>
-                                      <p:cBhvr>
-                                        <p:cTn id="52" dur="1" fill="hold">
-                                          <p:stCondLst>
-                                            <p:cond delay="0"/>
-                                          </p:stCondLst>
-                                        </p:cTn>
-                                        <p:tgtEl>
-                                          <p:spTgt spid="5"/>
-                                        </p:tgtEl>
-                                        <p:attrNameLst>
-                                          <p:attrName>style.visibility</p:attrName>
-                                        </p:attrNameLst>
-                                      </p:cBhvr>
-                                      <p:to>
-                                        <p:strVal val="visible"/>
-                                      </p:to>
-                                    </p:set>
-                                    <p:anim calcmode="lin" valueType="num">
-                                      <p:cBhvr additive="base">
-                                        <p:cTn id="53" dur="500" fill="hold"/>
-                                        <p:tgtEl>
-                                          <p:spTgt spid="5"/>
-                                        </p:tgtEl>
-                                        <p:attrNameLst>
-                                          <p:attrName>ppt_x</p:attrName>
-                                        </p:attrNameLst>
-                                      </p:cBhvr>
-                                      <p:tavLst>
-                                        <p:tav tm="0">
-                                          <p:val>
-                                            <p:strVal val="#ppt_x"/>
-                                          </p:val>
-                                        </p:tav>
-                                        <p:tav tm="100000">
-                                          <p:val>
-                                            <p:strVal val="#ppt_x"/>
-                                          </p:val>
-                                        </p:tav>
-                                      </p:tavLst>
-                                    </p:anim>
-                                    <p:anim calcmode="lin" valueType="num">
-                                      <p:cBhvr additive="base">
-                                        <p:cTn id="54" dur="500" fill="hold"/>
-                                        <p:tgtEl>
-                                          <p:spTgt spid="5"/>
-                                        </p:tgtEl>
-                                        <p:attrNameLst>
-                                          <p:attrName>ppt_y</p:attrName>
-                                        </p:attrNameLst>
-                                      </p:cBhvr>
-                                      <p:tavLst>
-                                        <p:tav tm="0">
-                                          <p:val>
-                                            <p:strVal val="1+#ppt_h/2"/>
-                                          </p:val>
-                                        </p:tav>
-                                        <p:tav tm="100000">
-                                          <p:val>
-                                            <p:strVal val="#ppt_y"/>
-                                          </p:val>
-                                        </p:tav>
-                                      </p:tavLst>
-                                    </p:anim>
-                                  </p:childTnLst>
-                                </p:cTn>
-                              </p:par>
-                            </p:childTnLst>
-                          </p:cTn>
-                        </p:par>
-                      </p:childTnLst>
-                    </p:cTn>
-                  </p:par>
                 </p:childTnLst>
               </p:cTn>
               <p:prevCondLst>
@@ -37092,7 +36791,7 @@
           <a:graphicData uri="http://schemas.openxmlformats.org/presentationml/2006/ole">
             <mc:AlternateContent xmlns:mc="http://schemas.openxmlformats.org/markup-compatibility/2006">
               <mc:Choice xmlns:v="urn:schemas-microsoft-com:vml" Requires="v">
-                <p:oleObj spid="_x0000_s2095" name="CorelDRAW" r:id="rId4" imgW="1340640" imgH="1167840" progId="">
+                <p:oleObj spid="_x0000_s2098" name="CorelDRAW" r:id="rId4" imgW="1340640" imgH="1167840" progId="">
                   <p:embed/>
                 </p:oleObj>
               </mc:Choice>
@@ -37653,7 +37352,7 @@
           <a:graphicData uri="http://schemas.openxmlformats.org/presentationml/2006/ole">
             <mc:AlternateContent xmlns:mc="http://schemas.openxmlformats.org/markup-compatibility/2006">
               <mc:Choice xmlns:v="urn:schemas-microsoft-com:vml" Requires="v">
-                <p:oleObj spid="_x0000_s3119" name="CorelDRAW" r:id="rId4" imgW="1352520" imgH="1158840" progId="">
+                <p:oleObj spid="_x0000_s3122" name="CorelDRAW" r:id="rId4" imgW="1352520" imgH="1158840" progId="">
                   <p:embed/>
                 </p:oleObj>
               </mc:Choice>

</xml_diff>